<commit_message>
started putting in figures fro engineering section maintex compiling fine
</commit_message>
<xml_diff>
--- a/Written Report/Engineering_hardware/Engineering_hardware_Figures/engineering_figures_ppt.pptx
+++ b/Written Report/Engineering_hardware/Engineering_hardware_Figures/engineering_figures_ppt.pptx
@@ -6,7 +6,9 @@
   </p:sldMasterIdLst>
   <p:sldIdLst>
     <p:sldId id="256" r:id="rId2"/>
-    <p:sldId id="257" r:id="rId3"/>
+    <p:sldId id="259" r:id="rId3"/>
+    <p:sldId id="260" r:id="rId4"/>
+    <p:sldId id="261" r:id="rId5"/>
   </p:sldIdLst>
   <p:sldSz cx="12192000" cy="6858000"/>
   <p:notesSz cx="6858000" cy="9144000"/>
@@ -105,6 +107,11 @@
       </a:defRPr>
     </a:lvl9pPr>
   </p:defaultTextStyle>
+  <p:extLst>
+    <p:ext uri="{EFAFB233-063F-42B5-8137-9DF3F51BA10A}">
+      <p15:sldGuideLst xmlns:p15="http://schemas.microsoft.com/office/powerpoint/2012/main"/>
+    </p:ext>
+  </p:extLst>
 </p:presentation>
 </file>
 
@@ -3377,7 +3384,7 @@
         </p:blipFill>
         <p:spPr>
           <a:xfrm rot="16200000">
-            <a:off x="227772" y="964924"/>
+            <a:off x="2100115" y="935895"/>
             <a:ext cx="6229350" cy="4591050"/>
           </a:xfrm>
           <a:prstGeom prst="rect">
@@ -3402,7 +3409,7 @@
         </p:nvCxnSpPr>
         <p:spPr>
           <a:xfrm flipV="1">
-            <a:off x="3896139" y="1154398"/>
+            <a:off x="5768482" y="1125369"/>
             <a:ext cx="1895059" cy="583763"/>
           </a:xfrm>
           <a:prstGeom prst="line">
@@ -3445,7 +3452,7 @@
         </p:nvSpPr>
         <p:spPr>
           <a:xfrm>
-            <a:off x="5791198" y="831232"/>
+            <a:off x="7663541" y="802203"/>
             <a:ext cx="3525079" cy="646331"/>
           </a:xfrm>
           <a:prstGeom prst="rect">
@@ -3464,7 +3471,7 @@
                 <a:latin typeface="CountryBlueprint" panose="00000400000000000000" pitchFamily="2" charset="2"/>
                 <a:ea typeface="Dotum" panose="020B0503020000020004" pitchFamily="34" charset="-127"/>
               </a:rPr>
-              <a:t>transparent, 2 part perforated hemispheres </a:t>
+              <a:t>Transparent, 2 part perforated hemispheres </a:t>
             </a:r>
             <a:endParaRPr lang="en-GB" dirty="0">
               <a:latin typeface="CountryBlueprint" panose="00000400000000000000" pitchFamily="2" charset="2"/>
@@ -3487,7 +3494,7 @@
         </p:nvSpPr>
         <p:spPr>
           <a:xfrm>
-            <a:off x="5791198" y="2153480"/>
+            <a:off x="7663541" y="2124451"/>
             <a:ext cx="3525079" cy="369332"/>
           </a:xfrm>
           <a:prstGeom prst="rect">
@@ -3532,7 +3539,7 @@
         </p:nvCxnSpPr>
         <p:spPr>
           <a:xfrm flipV="1">
-            <a:off x="4267200" y="2338146"/>
+            <a:off x="6139543" y="2309117"/>
             <a:ext cx="1523998" cy="408458"/>
           </a:xfrm>
           <a:prstGeom prst="line">
@@ -3575,7 +3582,7 @@
         </p:nvSpPr>
         <p:spPr>
           <a:xfrm>
-            <a:off x="5791198" y="3317077"/>
+            <a:off x="7663541" y="3288048"/>
             <a:ext cx="3525079" cy="369332"/>
           </a:xfrm>
           <a:prstGeom prst="rect">
@@ -3620,7 +3627,7 @@
         </p:nvCxnSpPr>
         <p:spPr>
           <a:xfrm flipV="1">
-            <a:off x="4267200" y="3501743"/>
+            <a:off x="6139543" y="3472714"/>
             <a:ext cx="1523998" cy="369332"/>
           </a:xfrm>
           <a:prstGeom prst="line">
@@ -3663,7 +3670,7 @@
         </p:nvSpPr>
         <p:spPr>
           <a:xfrm>
-            <a:off x="5791198" y="4901106"/>
+            <a:off x="7663541" y="4872077"/>
             <a:ext cx="3525079" cy="369332"/>
           </a:xfrm>
           <a:prstGeom prst="rect">
@@ -3708,7 +3715,7 @@
         </p:nvCxnSpPr>
         <p:spPr>
           <a:xfrm>
-            <a:off x="4108174" y="4716440"/>
+            <a:off x="5980517" y="4687411"/>
             <a:ext cx="1683024" cy="369332"/>
           </a:xfrm>
           <a:prstGeom prst="line">
@@ -3737,6 +3744,48 @@
           </a:fontRef>
         </p:style>
       </p:cxnSp>
+      <p:pic>
+        <p:nvPicPr>
+          <p:cNvPr id="11" name="Picture 10">
+            <a:extLst>
+              <a:ext uri="{FF2B5EF4-FFF2-40B4-BE49-F238E27FC236}">
+                <a16:creationId xmlns:a16="http://schemas.microsoft.com/office/drawing/2014/main" id="{81AB37AB-2C07-442A-A54A-ADF60E2314D8}"/>
+              </a:ext>
+            </a:extLst>
+          </p:cNvPr>
+          <p:cNvPicPr>
+            <a:picLocks noChangeAspect="1"/>
+          </p:cNvPicPr>
+          <p:nvPr/>
+        </p:nvPicPr>
+        <p:blipFill>
+          <a:blip r:embed="rId4">
+            <a:extLst>
+              <a:ext uri="{BEBA8EAE-BF5A-486C-A8C5-ECC9F3942E4B}">
+                <a14:imgProps xmlns:a14="http://schemas.microsoft.com/office/drawing/2010/main">
+                  <a14:imgLayer r:embed="rId5">
+                    <a14:imgEffect>
+                      <a14:brightnessContrast contrast="-40000"/>
+                    </a14:imgEffect>
+                  </a14:imgLayer>
+                </a14:imgProps>
+              </a:ext>
+            </a:extLst>
+          </a:blip>
+          <a:stretch>
+            <a:fillRect/>
+          </a:stretch>
+        </p:blipFill>
+        <p:spPr>
+          <a:xfrm rot="16200000">
+            <a:off x="656784" y="804869"/>
+            <a:ext cx="2551222" cy="2411478"/>
+          </a:xfrm>
+          <a:prstGeom prst="rect">
+            <a:avLst/>
+          </a:prstGeom>
+        </p:spPr>
+      </p:pic>
     </p:spTree>
     <p:extLst>
       <p:ext uri="{BB962C8B-B14F-4D97-AF65-F5344CB8AC3E}">
@@ -3767,10 +3816,1206 @@
           <a:chExt cx="0" cy="0"/>
         </a:xfrm>
       </p:grpSpPr>
+      <p:pic>
+        <p:nvPicPr>
+          <p:cNvPr id="2" name="Picture 1">
+            <a:extLst>
+              <a:ext uri="{FF2B5EF4-FFF2-40B4-BE49-F238E27FC236}">
+                <a16:creationId xmlns:a16="http://schemas.microsoft.com/office/drawing/2014/main" id="{6EC7DB22-4EFB-4045-A250-D586B5C46F3D}"/>
+              </a:ext>
+            </a:extLst>
+          </p:cNvPr>
+          <p:cNvPicPr>
+            <a:picLocks noChangeAspect="1"/>
+          </p:cNvPicPr>
+          <p:nvPr/>
+        </p:nvPicPr>
+        <p:blipFill>
+          <a:blip r:embed="rId2">
+            <a:extLst>
+              <a:ext uri="{BEBA8EAE-BF5A-486C-A8C5-ECC9F3942E4B}">
+                <a14:imgProps xmlns:a14="http://schemas.microsoft.com/office/drawing/2010/main">
+                  <a14:imgLayer r:embed="rId3">
+                    <a14:imgEffect>
+                      <a14:brightnessContrast contrast="-40000"/>
+                    </a14:imgEffect>
+                  </a14:imgLayer>
+                </a14:imgProps>
+              </a:ext>
+            </a:extLst>
+          </a:blip>
+          <a:stretch>
+            <a:fillRect/>
+          </a:stretch>
+        </p:blipFill>
+        <p:spPr>
+          <a:xfrm rot="5400000">
+            <a:off x="2665578" y="1283884"/>
+            <a:ext cx="5437577" cy="4676983"/>
+          </a:xfrm>
+          <a:prstGeom prst="rect">
+            <a:avLst/>
+          </a:prstGeom>
+        </p:spPr>
+      </p:pic>
+      <p:cxnSp>
+        <p:nvCxnSpPr>
+          <p:cNvPr id="3" name="Straight Connector 2">
+            <a:extLst>
+              <a:ext uri="{FF2B5EF4-FFF2-40B4-BE49-F238E27FC236}">
+                <a16:creationId xmlns:a16="http://schemas.microsoft.com/office/drawing/2014/main" id="{7E8F515C-E6DE-496F-8E65-FA7D8D986F1F}"/>
+              </a:ext>
+            </a:extLst>
+          </p:cNvPr>
+          <p:cNvCxnSpPr>
+            <a:cxnSpLocks/>
+            <a:endCxn id="4" idx="1"/>
+          </p:cNvCxnSpPr>
+          <p:nvPr/>
+        </p:nvCxnSpPr>
+        <p:spPr>
+          <a:xfrm flipV="1">
+            <a:off x="6013329" y="903587"/>
+            <a:ext cx="1895059" cy="583764"/>
+          </a:xfrm>
+          <a:prstGeom prst="line">
+            <a:avLst/>
+          </a:prstGeom>
+          <a:ln>
+            <a:solidFill>
+              <a:schemeClr val="bg2">
+                <a:lumMod val="25000"/>
+              </a:schemeClr>
+            </a:solidFill>
+          </a:ln>
+        </p:spPr>
+        <p:style>
+          <a:lnRef idx="1">
+            <a:schemeClr val="dk1"/>
+          </a:lnRef>
+          <a:fillRef idx="0">
+            <a:schemeClr val="dk1"/>
+          </a:fillRef>
+          <a:effectRef idx="0">
+            <a:schemeClr val="dk1"/>
+          </a:effectRef>
+          <a:fontRef idx="minor">
+            <a:schemeClr val="tx1"/>
+          </a:fontRef>
+        </p:style>
+      </p:cxnSp>
+      <p:sp>
+        <p:nvSpPr>
+          <p:cNvPr id="4" name="TextBox 3">
+            <a:extLst>
+              <a:ext uri="{FF2B5EF4-FFF2-40B4-BE49-F238E27FC236}">
+                <a16:creationId xmlns:a16="http://schemas.microsoft.com/office/drawing/2014/main" id="{F28F2878-1576-4D07-86D9-44A638F26415}"/>
+              </a:ext>
+            </a:extLst>
+          </p:cNvPr>
+          <p:cNvSpPr txBox="1"/>
+          <p:nvPr/>
+        </p:nvSpPr>
+        <p:spPr>
+          <a:xfrm>
+            <a:off x="7908388" y="580421"/>
+            <a:ext cx="3525079" cy="646331"/>
+          </a:xfrm>
+          <a:prstGeom prst="rect">
+            <a:avLst/>
+          </a:prstGeom>
+          <a:noFill/>
+        </p:spPr>
+        <p:txBody>
+          <a:bodyPr wrap="square" rtlCol="0">
+            <a:spAutoFit/>
+          </a:bodyPr>
+          <a:lstStyle/>
+          <a:p>
+            <a:r>
+              <a:rPr lang="en-US" dirty="0">
+                <a:latin typeface="CountryBlueprint" panose="00000400000000000000" pitchFamily="2" charset="2"/>
+                <a:ea typeface="Dotum" panose="020B0503020000020004" pitchFamily="34" charset="-127"/>
+              </a:rPr>
+              <a:t>Rain cover, elevated to allow air flow</a:t>
+            </a:r>
+            <a:endParaRPr lang="en-GB" dirty="0">
+              <a:latin typeface="CountryBlueprint" panose="00000400000000000000" pitchFamily="2" charset="2"/>
+              <a:ea typeface="Dotum" panose="020B0503020000020004" pitchFamily="34" charset="-127"/>
+            </a:endParaRPr>
+          </a:p>
+        </p:txBody>
+      </p:sp>
+      <p:cxnSp>
+        <p:nvCxnSpPr>
+          <p:cNvPr id="5" name="Straight Connector 4">
+            <a:extLst>
+              <a:ext uri="{FF2B5EF4-FFF2-40B4-BE49-F238E27FC236}">
+                <a16:creationId xmlns:a16="http://schemas.microsoft.com/office/drawing/2014/main" id="{10FB2150-D846-4052-B16F-F1C8FFE6E3D8}"/>
+              </a:ext>
+            </a:extLst>
+          </p:cNvPr>
+          <p:cNvCxnSpPr>
+            <a:cxnSpLocks/>
+            <a:endCxn id="6" idx="1"/>
+          </p:cNvCxnSpPr>
+          <p:nvPr/>
+        </p:nvCxnSpPr>
+        <p:spPr>
+          <a:xfrm>
+            <a:off x="5880807" y="2782459"/>
+            <a:ext cx="2027580" cy="0"/>
+          </a:xfrm>
+          <a:prstGeom prst="line">
+            <a:avLst/>
+          </a:prstGeom>
+          <a:ln>
+            <a:solidFill>
+              <a:schemeClr val="bg2">
+                <a:lumMod val="25000"/>
+              </a:schemeClr>
+            </a:solidFill>
+          </a:ln>
+        </p:spPr>
+        <p:style>
+          <a:lnRef idx="1">
+            <a:schemeClr val="dk1"/>
+          </a:lnRef>
+          <a:fillRef idx="0">
+            <a:schemeClr val="dk1"/>
+          </a:fillRef>
+          <a:effectRef idx="0">
+            <a:schemeClr val="dk1"/>
+          </a:effectRef>
+          <a:fontRef idx="minor">
+            <a:schemeClr val="tx1"/>
+          </a:fontRef>
+        </p:style>
+      </p:cxnSp>
+      <p:sp>
+        <p:nvSpPr>
+          <p:cNvPr id="6" name="TextBox 5">
+            <a:extLst>
+              <a:ext uri="{FF2B5EF4-FFF2-40B4-BE49-F238E27FC236}">
+                <a16:creationId xmlns:a16="http://schemas.microsoft.com/office/drawing/2014/main" id="{1C41F2E8-30AD-4FE5-AAE5-F078804C713F}"/>
+              </a:ext>
+            </a:extLst>
+          </p:cNvPr>
+          <p:cNvSpPr txBox="1"/>
+          <p:nvPr/>
+        </p:nvSpPr>
+        <p:spPr>
+          <a:xfrm>
+            <a:off x="7908387" y="2459293"/>
+            <a:ext cx="3525079" cy="646331"/>
+          </a:xfrm>
+          <a:prstGeom prst="rect">
+            <a:avLst/>
+          </a:prstGeom>
+          <a:noFill/>
+        </p:spPr>
+        <p:txBody>
+          <a:bodyPr wrap="square" rtlCol="0">
+            <a:spAutoFit/>
+          </a:bodyPr>
+          <a:lstStyle/>
+          <a:p>
+            <a:r>
+              <a:rPr lang="en-US" dirty="0">
+                <a:latin typeface="CountryBlueprint" panose="00000400000000000000" pitchFamily="2" charset="2"/>
+                <a:ea typeface="Dotum" panose="020B0503020000020004" pitchFamily="34" charset="-127"/>
+              </a:rPr>
+              <a:t>Electronics and sensors mounted vertically inside chimney</a:t>
+            </a:r>
+            <a:endParaRPr lang="en-GB" dirty="0">
+              <a:latin typeface="CountryBlueprint" panose="00000400000000000000" pitchFamily="2" charset="2"/>
+              <a:ea typeface="Dotum" panose="020B0503020000020004" pitchFamily="34" charset="-127"/>
+            </a:endParaRPr>
+          </a:p>
+        </p:txBody>
+      </p:sp>
+      <p:cxnSp>
+        <p:nvCxnSpPr>
+          <p:cNvPr id="7" name="Straight Connector 6">
+            <a:extLst>
+              <a:ext uri="{FF2B5EF4-FFF2-40B4-BE49-F238E27FC236}">
+                <a16:creationId xmlns:a16="http://schemas.microsoft.com/office/drawing/2014/main" id="{7F974EE9-24B1-4872-9395-E35E39692D3F}"/>
+              </a:ext>
+            </a:extLst>
+          </p:cNvPr>
+          <p:cNvCxnSpPr>
+            <a:cxnSpLocks/>
+          </p:cNvCxnSpPr>
+          <p:nvPr/>
+        </p:nvCxnSpPr>
+        <p:spPr>
+          <a:xfrm flipV="1">
+            <a:off x="7093383" y="5182526"/>
+            <a:ext cx="815005" cy="1"/>
+          </a:xfrm>
+          <a:prstGeom prst="line">
+            <a:avLst/>
+          </a:prstGeom>
+          <a:ln>
+            <a:solidFill>
+              <a:schemeClr val="bg2">
+                <a:lumMod val="25000"/>
+              </a:schemeClr>
+            </a:solidFill>
+          </a:ln>
+        </p:spPr>
+        <p:style>
+          <a:lnRef idx="1">
+            <a:schemeClr val="dk1"/>
+          </a:lnRef>
+          <a:fillRef idx="0">
+            <a:schemeClr val="dk1"/>
+          </a:fillRef>
+          <a:effectRef idx="0">
+            <a:schemeClr val="dk1"/>
+          </a:effectRef>
+          <a:fontRef idx="minor">
+            <a:schemeClr val="tx1"/>
+          </a:fontRef>
+        </p:style>
+      </p:cxnSp>
+      <p:sp>
+        <p:nvSpPr>
+          <p:cNvPr id="8" name="TextBox 7">
+            <a:extLst>
+              <a:ext uri="{FF2B5EF4-FFF2-40B4-BE49-F238E27FC236}">
+                <a16:creationId xmlns:a16="http://schemas.microsoft.com/office/drawing/2014/main" id="{6C123016-E974-4279-A325-20F195DB72C7}"/>
+              </a:ext>
+            </a:extLst>
+          </p:cNvPr>
+          <p:cNvSpPr txBox="1"/>
+          <p:nvPr/>
+        </p:nvSpPr>
+        <p:spPr>
+          <a:xfrm>
+            <a:off x="7908387" y="4859360"/>
+            <a:ext cx="3525079" cy="369332"/>
+          </a:xfrm>
+          <a:prstGeom prst="rect">
+            <a:avLst/>
+          </a:prstGeom>
+          <a:noFill/>
+        </p:spPr>
+        <p:txBody>
+          <a:bodyPr wrap="square" rtlCol="0">
+            <a:spAutoFit/>
+          </a:bodyPr>
+          <a:lstStyle/>
+          <a:p>
+            <a:r>
+              <a:rPr lang="en-US" dirty="0">
+                <a:latin typeface="CountryBlueprint" panose="00000400000000000000" pitchFamily="2" charset="2"/>
+                <a:ea typeface="Dotum" panose="020B0503020000020004" pitchFamily="34" charset="-127"/>
+              </a:rPr>
+              <a:t>Open segments to allow air intake</a:t>
+            </a:r>
+            <a:endParaRPr lang="en-GB" dirty="0">
+              <a:latin typeface="CountryBlueprint" panose="00000400000000000000" pitchFamily="2" charset="2"/>
+              <a:ea typeface="Dotum" panose="020B0503020000020004" pitchFamily="34" charset="-127"/>
+            </a:endParaRPr>
+          </a:p>
+        </p:txBody>
+      </p:sp>
+      <p:pic>
+        <p:nvPicPr>
+          <p:cNvPr id="12" name="Picture 11">
+            <a:extLst>
+              <a:ext uri="{FF2B5EF4-FFF2-40B4-BE49-F238E27FC236}">
+                <a16:creationId xmlns:a16="http://schemas.microsoft.com/office/drawing/2014/main" id="{EBF4B653-D1C3-49FE-AAC3-237DADD668E2}"/>
+              </a:ext>
+            </a:extLst>
+          </p:cNvPr>
+          <p:cNvPicPr>
+            <a:picLocks noChangeAspect="1"/>
+          </p:cNvPicPr>
+          <p:nvPr/>
+        </p:nvPicPr>
+        <p:blipFill>
+          <a:blip r:embed="rId4">
+            <a:extLst>
+              <a:ext uri="{BEBA8EAE-BF5A-486C-A8C5-ECC9F3942E4B}">
+                <a14:imgProps xmlns:a14="http://schemas.microsoft.com/office/drawing/2010/main">
+                  <a14:imgLayer r:embed="rId5">
+                    <a14:imgEffect>
+                      <a14:brightnessContrast contrast="-40000"/>
+                    </a14:imgEffect>
+                  </a14:imgLayer>
+                </a14:imgProps>
+              </a:ext>
+            </a:extLst>
+          </a:blip>
+          <a:stretch>
+            <a:fillRect/>
+          </a:stretch>
+        </p:blipFill>
+        <p:spPr>
+          <a:xfrm rot="5400000">
+            <a:off x="259119" y="920617"/>
+            <a:ext cx="2869696" cy="2835635"/>
+          </a:xfrm>
+          <a:prstGeom prst="rect">
+            <a:avLst/>
+          </a:prstGeom>
+        </p:spPr>
+      </p:pic>
     </p:spTree>
     <p:extLst>
       <p:ext uri="{BB962C8B-B14F-4D97-AF65-F5344CB8AC3E}">
-        <p14:creationId xmlns:p14="http://schemas.microsoft.com/office/powerpoint/2010/main" val="691750219"/>
+        <p14:creationId xmlns:p14="http://schemas.microsoft.com/office/powerpoint/2010/main" val="1523023209"/>
+      </p:ext>
+    </p:extLst>
+  </p:cSld>
+  <p:clrMapOvr>
+    <a:masterClrMapping/>
+  </p:clrMapOvr>
+</p:sld>
+</file>
+
+<file path=ppt/slides/slide3.xml><?xml version="1.0" encoding="utf-8"?>
+<p:sld xmlns:a="http://schemas.openxmlformats.org/drawingml/2006/main" xmlns:r="http://schemas.openxmlformats.org/officeDocument/2006/relationships" xmlns:p="http://schemas.openxmlformats.org/presentationml/2006/main">
+  <p:cSld>
+    <p:spTree>
+      <p:nvGrpSpPr>
+        <p:cNvPr id="1" name=""/>
+        <p:cNvGrpSpPr/>
+        <p:nvPr/>
+      </p:nvGrpSpPr>
+      <p:grpSpPr>
+        <a:xfrm>
+          <a:off x="0" y="0"/>
+          <a:ext cx="0" cy="0"/>
+          <a:chOff x="0" y="0"/>
+          <a:chExt cx="0" cy="0"/>
+        </a:xfrm>
+      </p:grpSpPr>
+      <p:pic>
+        <p:nvPicPr>
+          <p:cNvPr id="2" name="Picture 1">
+            <a:extLst>
+              <a:ext uri="{FF2B5EF4-FFF2-40B4-BE49-F238E27FC236}">
+                <a16:creationId xmlns:a16="http://schemas.microsoft.com/office/drawing/2014/main" id="{EC064B35-5C27-4DDE-8221-183447A67E24}"/>
+              </a:ext>
+            </a:extLst>
+          </p:cNvPr>
+          <p:cNvPicPr>
+            <a:picLocks noChangeAspect="1"/>
+          </p:cNvPicPr>
+          <p:nvPr/>
+        </p:nvPicPr>
+        <p:blipFill>
+          <a:blip r:embed="rId2">
+            <a:extLst>
+              <a:ext uri="{BEBA8EAE-BF5A-486C-A8C5-ECC9F3942E4B}">
+                <a14:imgProps xmlns:a14="http://schemas.microsoft.com/office/drawing/2010/main">
+                  <a14:imgLayer r:embed="rId3">
+                    <a14:imgEffect>
+                      <a14:brightnessContrast contrast="-40000"/>
+                    </a14:imgEffect>
+                  </a14:imgLayer>
+                </a14:imgProps>
+              </a:ext>
+            </a:extLst>
+          </a:blip>
+          <a:stretch>
+            <a:fillRect/>
+          </a:stretch>
+        </p:blipFill>
+        <p:spPr>
+          <a:xfrm rot="5400000">
+            <a:off x="127855" y="839058"/>
+            <a:ext cx="6589590" cy="4838700"/>
+          </a:xfrm>
+          <a:prstGeom prst="rect">
+            <a:avLst/>
+          </a:prstGeom>
+        </p:spPr>
+      </p:pic>
+      <p:cxnSp>
+        <p:nvCxnSpPr>
+          <p:cNvPr id="3" name="Straight Connector 2">
+            <a:extLst>
+              <a:ext uri="{FF2B5EF4-FFF2-40B4-BE49-F238E27FC236}">
+                <a16:creationId xmlns:a16="http://schemas.microsoft.com/office/drawing/2014/main" id="{F955E3D5-FF51-4C00-A74E-266F043AA54A}"/>
+              </a:ext>
+            </a:extLst>
+          </p:cNvPr>
+          <p:cNvCxnSpPr>
+            <a:cxnSpLocks/>
+            <a:endCxn id="4" idx="1"/>
+          </p:cNvCxnSpPr>
+          <p:nvPr/>
+        </p:nvCxnSpPr>
+        <p:spPr>
+          <a:xfrm flipV="1">
+            <a:off x="4597400" y="1791349"/>
+            <a:ext cx="1405833" cy="472344"/>
+          </a:xfrm>
+          <a:prstGeom prst="line">
+            <a:avLst/>
+          </a:prstGeom>
+          <a:ln>
+            <a:solidFill>
+              <a:schemeClr val="bg2">
+                <a:lumMod val="25000"/>
+              </a:schemeClr>
+            </a:solidFill>
+          </a:ln>
+        </p:spPr>
+        <p:style>
+          <a:lnRef idx="1">
+            <a:schemeClr val="dk1"/>
+          </a:lnRef>
+          <a:fillRef idx="0">
+            <a:schemeClr val="dk1"/>
+          </a:fillRef>
+          <a:effectRef idx="0">
+            <a:schemeClr val="dk1"/>
+          </a:effectRef>
+          <a:fontRef idx="minor">
+            <a:schemeClr val="tx1"/>
+          </a:fontRef>
+        </p:style>
+      </p:cxnSp>
+      <p:sp>
+        <p:nvSpPr>
+          <p:cNvPr id="4" name="TextBox 3">
+            <a:extLst>
+              <a:ext uri="{FF2B5EF4-FFF2-40B4-BE49-F238E27FC236}">
+                <a16:creationId xmlns:a16="http://schemas.microsoft.com/office/drawing/2014/main" id="{E9D23429-7D14-4D73-B2B3-5921E64A7B3B}"/>
+              </a:ext>
+            </a:extLst>
+          </p:cNvPr>
+          <p:cNvSpPr txBox="1"/>
+          <p:nvPr/>
+        </p:nvSpPr>
+        <p:spPr>
+          <a:xfrm>
+            <a:off x="6003233" y="1606683"/>
+            <a:ext cx="3525079" cy="369332"/>
+          </a:xfrm>
+          <a:prstGeom prst="rect">
+            <a:avLst/>
+          </a:prstGeom>
+          <a:noFill/>
+        </p:spPr>
+        <p:txBody>
+          <a:bodyPr wrap="square" rtlCol="0">
+            <a:spAutoFit/>
+          </a:bodyPr>
+          <a:lstStyle/>
+          <a:p>
+            <a:r>
+              <a:rPr lang="en-US" dirty="0">
+                <a:latin typeface="CountryBlueprint" panose="00000400000000000000" pitchFamily="2" charset="2"/>
+                <a:ea typeface="Dotum" panose="020B0503020000020004" pitchFamily="34" charset="-127"/>
+              </a:rPr>
+              <a:t>Slits for allowing air flow</a:t>
+            </a:r>
+            <a:endParaRPr lang="en-GB" dirty="0">
+              <a:latin typeface="CountryBlueprint" panose="00000400000000000000" pitchFamily="2" charset="2"/>
+              <a:ea typeface="Dotum" panose="020B0503020000020004" pitchFamily="34" charset="-127"/>
+            </a:endParaRPr>
+          </a:p>
+        </p:txBody>
+      </p:sp>
+      <p:sp>
+        <p:nvSpPr>
+          <p:cNvPr id="5" name="TextBox 4">
+            <a:extLst>
+              <a:ext uri="{FF2B5EF4-FFF2-40B4-BE49-F238E27FC236}">
+                <a16:creationId xmlns:a16="http://schemas.microsoft.com/office/drawing/2014/main" id="{8A428C70-E615-4ECB-82ED-F82EE7D30E24}"/>
+              </a:ext>
+            </a:extLst>
+          </p:cNvPr>
+          <p:cNvSpPr txBox="1"/>
+          <p:nvPr/>
+        </p:nvSpPr>
+        <p:spPr>
+          <a:xfrm>
+            <a:off x="6003233" y="765662"/>
+            <a:ext cx="3525079" cy="369332"/>
+          </a:xfrm>
+          <a:prstGeom prst="rect">
+            <a:avLst/>
+          </a:prstGeom>
+          <a:noFill/>
+        </p:spPr>
+        <p:txBody>
+          <a:bodyPr wrap="square" rtlCol="0">
+            <a:spAutoFit/>
+          </a:bodyPr>
+          <a:lstStyle/>
+          <a:p>
+            <a:r>
+              <a:rPr lang="en-US" dirty="0">
+                <a:latin typeface="CountryBlueprint" panose="00000400000000000000" pitchFamily="2" charset="2"/>
+                <a:ea typeface="Dotum" panose="020B0503020000020004" pitchFamily="34" charset="-127"/>
+              </a:rPr>
+              <a:t>Solar Panel</a:t>
+            </a:r>
+            <a:endParaRPr lang="en-GB" dirty="0">
+              <a:latin typeface="CountryBlueprint" panose="00000400000000000000" pitchFamily="2" charset="2"/>
+              <a:ea typeface="Dotum" panose="020B0503020000020004" pitchFamily="34" charset="-127"/>
+            </a:endParaRPr>
+          </a:p>
+        </p:txBody>
+      </p:sp>
+      <p:cxnSp>
+        <p:nvCxnSpPr>
+          <p:cNvPr id="6" name="Straight Connector 5">
+            <a:extLst>
+              <a:ext uri="{FF2B5EF4-FFF2-40B4-BE49-F238E27FC236}">
+                <a16:creationId xmlns:a16="http://schemas.microsoft.com/office/drawing/2014/main" id="{EF9FF431-7324-479B-A6CF-E8B00B61D5E3}"/>
+              </a:ext>
+            </a:extLst>
+          </p:cNvPr>
+          <p:cNvCxnSpPr>
+            <a:cxnSpLocks/>
+            <a:endCxn id="5" idx="1"/>
+          </p:cNvCxnSpPr>
+          <p:nvPr/>
+        </p:nvCxnSpPr>
+        <p:spPr>
+          <a:xfrm>
+            <a:off x="4965700" y="950328"/>
+            <a:ext cx="1037533" cy="0"/>
+          </a:xfrm>
+          <a:prstGeom prst="line">
+            <a:avLst/>
+          </a:prstGeom>
+          <a:ln>
+            <a:solidFill>
+              <a:schemeClr val="bg2">
+                <a:lumMod val="25000"/>
+              </a:schemeClr>
+            </a:solidFill>
+          </a:ln>
+        </p:spPr>
+        <p:style>
+          <a:lnRef idx="1">
+            <a:schemeClr val="dk1"/>
+          </a:lnRef>
+          <a:fillRef idx="0">
+            <a:schemeClr val="dk1"/>
+          </a:fillRef>
+          <a:effectRef idx="0">
+            <a:schemeClr val="dk1"/>
+          </a:effectRef>
+          <a:fontRef idx="minor">
+            <a:schemeClr val="tx1"/>
+          </a:fontRef>
+        </p:style>
+      </p:cxnSp>
+      <p:sp>
+        <p:nvSpPr>
+          <p:cNvPr id="7" name="TextBox 6">
+            <a:extLst>
+              <a:ext uri="{FF2B5EF4-FFF2-40B4-BE49-F238E27FC236}">
+                <a16:creationId xmlns:a16="http://schemas.microsoft.com/office/drawing/2014/main" id="{BE8F6280-8EEE-4306-AB3A-006555AB482C}"/>
+              </a:ext>
+            </a:extLst>
+          </p:cNvPr>
+          <p:cNvSpPr txBox="1"/>
+          <p:nvPr/>
+        </p:nvSpPr>
+        <p:spPr>
+          <a:xfrm>
+            <a:off x="6003233" y="2715794"/>
+            <a:ext cx="3525079" cy="369332"/>
+          </a:xfrm>
+          <a:prstGeom prst="rect">
+            <a:avLst/>
+          </a:prstGeom>
+          <a:noFill/>
+        </p:spPr>
+        <p:txBody>
+          <a:bodyPr wrap="square" rtlCol="0">
+            <a:spAutoFit/>
+          </a:bodyPr>
+          <a:lstStyle/>
+          <a:p>
+            <a:r>
+              <a:rPr lang="en-US" dirty="0">
+                <a:latin typeface="CountryBlueprint" panose="00000400000000000000" pitchFamily="2" charset="2"/>
+                <a:ea typeface="Dotum" panose="020B0503020000020004" pitchFamily="34" charset="-127"/>
+              </a:rPr>
+              <a:t>Electric fan</a:t>
+            </a:r>
+            <a:endParaRPr lang="en-GB" dirty="0">
+              <a:latin typeface="CountryBlueprint" panose="00000400000000000000" pitchFamily="2" charset="2"/>
+              <a:ea typeface="Dotum" panose="020B0503020000020004" pitchFamily="34" charset="-127"/>
+            </a:endParaRPr>
+          </a:p>
+        </p:txBody>
+      </p:sp>
+      <p:cxnSp>
+        <p:nvCxnSpPr>
+          <p:cNvPr id="8" name="Straight Connector 7">
+            <a:extLst>
+              <a:ext uri="{FF2B5EF4-FFF2-40B4-BE49-F238E27FC236}">
+                <a16:creationId xmlns:a16="http://schemas.microsoft.com/office/drawing/2014/main" id="{EAA3D321-E99D-4DFA-963F-9D23C88DB793}"/>
+              </a:ext>
+            </a:extLst>
+          </p:cNvPr>
+          <p:cNvCxnSpPr>
+            <a:cxnSpLocks/>
+            <a:endCxn id="7" idx="1"/>
+          </p:cNvCxnSpPr>
+          <p:nvPr/>
+        </p:nvCxnSpPr>
+        <p:spPr>
+          <a:xfrm>
+            <a:off x="4495800" y="2555096"/>
+            <a:ext cx="1507433" cy="345364"/>
+          </a:xfrm>
+          <a:prstGeom prst="line">
+            <a:avLst/>
+          </a:prstGeom>
+          <a:ln>
+            <a:solidFill>
+              <a:schemeClr val="bg2">
+                <a:lumMod val="25000"/>
+              </a:schemeClr>
+            </a:solidFill>
+          </a:ln>
+        </p:spPr>
+        <p:style>
+          <a:lnRef idx="1">
+            <a:schemeClr val="dk1"/>
+          </a:lnRef>
+          <a:fillRef idx="0">
+            <a:schemeClr val="dk1"/>
+          </a:fillRef>
+          <a:effectRef idx="0">
+            <a:schemeClr val="dk1"/>
+          </a:effectRef>
+          <a:fontRef idx="minor">
+            <a:schemeClr val="tx1"/>
+          </a:fontRef>
+        </p:style>
+      </p:cxnSp>
+      <p:sp>
+        <p:nvSpPr>
+          <p:cNvPr id="9" name="TextBox 8">
+            <a:extLst>
+              <a:ext uri="{FF2B5EF4-FFF2-40B4-BE49-F238E27FC236}">
+                <a16:creationId xmlns:a16="http://schemas.microsoft.com/office/drawing/2014/main" id="{C353ED93-6427-4F2D-B1F7-AB5FF09A2760}"/>
+              </a:ext>
+            </a:extLst>
+          </p:cNvPr>
+          <p:cNvSpPr txBox="1"/>
+          <p:nvPr/>
+        </p:nvSpPr>
+        <p:spPr>
+          <a:xfrm>
+            <a:off x="6003233" y="3504626"/>
+            <a:ext cx="3525079" cy="369332"/>
+          </a:xfrm>
+          <a:prstGeom prst="rect">
+            <a:avLst/>
+          </a:prstGeom>
+          <a:noFill/>
+        </p:spPr>
+        <p:txBody>
+          <a:bodyPr wrap="square" rtlCol="0">
+            <a:spAutoFit/>
+          </a:bodyPr>
+          <a:lstStyle/>
+          <a:p>
+            <a:r>
+              <a:rPr lang="en-US" dirty="0">
+                <a:latin typeface="CountryBlueprint" panose="00000400000000000000" pitchFamily="2" charset="2"/>
+                <a:ea typeface="Dotum" panose="020B0503020000020004" pitchFamily="34" charset="-127"/>
+              </a:rPr>
+              <a:t>Electronics Enclosure</a:t>
+            </a:r>
+            <a:endParaRPr lang="en-GB" dirty="0">
+              <a:latin typeface="CountryBlueprint" panose="00000400000000000000" pitchFamily="2" charset="2"/>
+              <a:ea typeface="Dotum" panose="020B0503020000020004" pitchFamily="34" charset="-127"/>
+            </a:endParaRPr>
+          </a:p>
+        </p:txBody>
+      </p:sp>
+      <p:cxnSp>
+        <p:nvCxnSpPr>
+          <p:cNvPr id="10" name="Straight Connector 9">
+            <a:extLst>
+              <a:ext uri="{FF2B5EF4-FFF2-40B4-BE49-F238E27FC236}">
+                <a16:creationId xmlns:a16="http://schemas.microsoft.com/office/drawing/2014/main" id="{E2FADC3F-ED9E-410D-A764-7B0FC07D840F}"/>
+              </a:ext>
+            </a:extLst>
+          </p:cNvPr>
+          <p:cNvCxnSpPr>
+            <a:cxnSpLocks/>
+            <a:endCxn id="9" idx="1"/>
+          </p:cNvCxnSpPr>
+          <p:nvPr/>
+        </p:nvCxnSpPr>
+        <p:spPr>
+          <a:xfrm>
+            <a:off x="4216400" y="3071836"/>
+            <a:ext cx="1786833" cy="617456"/>
+          </a:xfrm>
+          <a:prstGeom prst="line">
+            <a:avLst/>
+          </a:prstGeom>
+          <a:ln>
+            <a:solidFill>
+              <a:schemeClr val="bg2">
+                <a:lumMod val="25000"/>
+              </a:schemeClr>
+            </a:solidFill>
+          </a:ln>
+        </p:spPr>
+        <p:style>
+          <a:lnRef idx="1">
+            <a:schemeClr val="dk1"/>
+          </a:lnRef>
+          <a:fillRef idx="0">
+            <a:schemeClr val="dk1"/>
+          </a:fillRef>
+          <a:effectRef idx="0">
+            <a:schemeClr val="dk1"/>
+          </a:effectRef>
+          <a:fontRef idx="minor">
+            <a:schemeClr val="tx1"/>
+          </a:fontRef>
+        </p:style>
+      </p:cxnSp>
+      <p:sp>
+        <p:nvSpPr>
+          <p:cNvPr id="14" name="TextBox 13">
+            <a:extLst>
+              <a:ext uri="{FF2B5EF4-FFF2-40B4-BE49-F238E27FC236}">
+                <a16:creationId xmlns:a16="http://schemas.microsoft.com/office/drawing/2014/main" id="{E4851E38-B126-4F75-BF12-169E3931FB93}"/>
+              </a:ext>
+            </a:extLst>
+          </p:cNvPr>
+          <p:cNvSpPr txBox="1"/>
+          <p:nvPr/>
+        </p:nvSpPr>
+        <p:spPr>
+          <a:xfrm>
+            <a:off x="6003233" y="5033091"/>
+            <a:ext cx="3525079" cy="369332"/>
+          </a:xfrm>
+          <a:prstGeom prst="rect">
+            <a:avLst/>
+          </a:prstGeom>
+          <a:noFill/>
+        </p:spPr>
+        <p:txBody>
+          <a:bodyPr wrap="square" rtlCol="0">
+            <a:spAutoFit/>
+          </a:bodyPr>
+          <a:lstStyle/>
+          <a:p>
+            <a:r>
+              <a:rPr lang="en-US" dirty="0">
+                <a:latin typeface="CountryBlueprint" panose="00000400000000000000" pitchFamily="2" charset="2"/>
+                <a:ea typeface="Dotum" panose="020B0503020000020004" pitchFamily="34" charset="-127"/>
+              </a:rPr>
+              <a:t>Universal transfer bearings</a:t>
+            </a:r>
+            <a:endParaRPr lang="en-GB" dirty="0">
+              <a:latin typeface="CountryBlueprint" panose="00000400000000000000" pitchFamily="2" charset="2"/>
+              <a:ea typeface="Dotum" panose="020B0503020000020004" pitchFamily="34" charset="-127"/>
+            </a:endParaRPr>
+          </a:p>
+        </p:txBody>
+      </p:sp>
+      <p:cxnSp>
+        <p:nvCxnSpPr>
+          <p:cNvPr id="15" name="Straight Connector 14">
+            <a:extLst>
+              <a:ext uri="{FF2B5EF4-FFF2-40B4-BE49-F238E27FC236}">
+                <a16:creationId xmlns:a16="http://schemas.microsoft.com/office/drawing/2014/main" id="{B5C8695B-4960-4576-9CD8-E34D3DBAF520}"/>
+              </a:ext>
+            </a:extLst>
+          </p:cNvPr>
+          <p:cNvCxnSpPr>
+            <a:cxnSpLocks/>
+            <a:endCxn id="14" idx="1"/>
+          </p:cNvCxnSpPr>
+          <p:nvPr/>
+        </p:nvCxnSpPr>
+        <p:spPr>
+          <a:xfrm>
+            <a:off x="3759200" y="5033091"/>
+            <a:ext cx="2244033" cy="184666"/>
+          </a:xfrm>
+          <a:prstGeom prst="line">
+            <a:avLst/>
+          </a:prstGeom>
+          <a:ln>
+            <a:solidFill>
+              <a:schemeClr val="bg2">
+                <a:lumMod val="25000"/>
+              </a:schemeClr>
+            </a:solidFill>
+          </a:ln>
+        </p:spPr>
+        <p:style>
+          <a:lnRef idx="1">
+            <a:schemeClr val="dk1"/>
+          </a:lnRef>
+          <a:fillRef idx="0">
+            <a:schemeClr val="dk1"/>
+          </a:fillRef>
+          <a:effectRef idx="0">
+            <a:schemeClr val="dk1"/>
+          </a:effectRef>
+          <a:fontRef idx="minor">
+            <a:schemeClr val="tx1"/>
+          </a:fontRef>
+        </p:style>
+      </p:cxnSp>
+    </p:spTree>
+    <p:extLst>
+      <p:ext uri="{BB962C8B-B14F-4D97-AF65-F5344CB8AC3E}">
+        <p14:creationId xmlns:p14="http://schemas.microsoft.com/office/powerpoint/2010/main" val="3213557544"/>
+      </p:ext>
+    </p:extLst>
+  </p:cSld>
+  <p:clrMapOvr>
+    <a:masterClrMapping/>
+  </p:clrMapOvr>
+</p:sld>
+</file>
+
+<file path=ppt/slides/slide4.xml><?xml version="1.0" encoding="utf-8"?>
+<p:sld xmlns:a="http://schemas.openxmlformats.org/drawingml/2006/main" xmlns:r="http://schemas.openxmlformats.org/officeDocument/2006/relationships" xmlns:p="http://schemas.openxmlformats.org/presentationml/2006/main">
+  <p:cSld>
+    <p:spTree>
+      <p:nvGrpSpPr>
+        <p:cNvPr id="1" name=""/>
+        <p:cNvGrpSpPr/>
+        <p:nvPr/>
+      </p:nvGrpSpPr>
+      <p:grpSpPr>
+        <a:xfrm>
+          <a:off x="0" y="0"/>
+          <a:ext cx="0" cy="0"/>
+          <a:chOff x="0" y="0"/>
+          <a:chExt cx="0" cy="0"/>
+        </a:xfrm>
+      </p:grpSpPr>
+      <p:pic>
+        <p:nvPicPr>
+          <p:cNvPr id="4" name="Picture 3">
+            <a:extLst>
+              <a:ext uri="{FF2B5EF4-FFF2-40B4-BE49-F238E27FC236}">
+                <a16:creationId xmlns:a16="http://schemas.microsoft.com/office/drawing/2014/main" id="{0D5F1178-A821-479F-B11D-921419973199}"/>
+              </a:ext>
+            </a:extLst>
+          </p:cNvPr>
+          <p:cNvPicPr>
+            <a:picLocks noChangeAspect="1"/>
+          </p:cNvPicPr>
+          <p:nvPr/>
+        </p:nvPicPr>
+        <p:blipFill>
+          <a:blip r:embed="rId2">
+            <a:extLst>
+              <a:ext uri="{BEBA8EAE-BF5A-486C-A8C5-ECC9F3942E4B}">
+                <a14:imgProps xmlns:a14="http://schemas.microsoft.com/office/drawing/2010/main">
+                  <a14:imgLayer r:embed="rId3">
+                    <a14:imgEffect>
+                      <a14:brightnessContrast contrast="-40000"/>
+                    </a14:imgEffect>
+                  </a14:imgLayer>
+                </a14:imgProps>
+              </a:ext>
+            </a:extLst>
+          </a:blip>
+          <a:stretch>
+            <a:fillRect/>
+          </a:stretch>
+        </p:blipFill>
+        <p:spPr>
+          <a:xfrm rot="5245863">
+            <a:off x="5249785" y="-1"/>
+            <a:ext cx="5437864" cy="6858000"/>
+          </a:xfrm>
+          <a:prstGeom prst="rect">
+            <a:avLst/>
+          </a:prstGeom>
+        </p:spPr>
+      </p:pic>
+      <p:cxnSp>
+        <p:nvCxnSpPr>
+          <p:cNvPr id="5" name="Straight Connector 4">
+            <a:extLst>
+              <a:ext uri="{FF2B5EF4-FFF2-40B4-BE49-F238E27FC236}">
+                <a16:creationId xmlns:a16="http://schemas.microsoft.com/office/drawing/2014/main" id="{A7302D77-EDBA-4AE5-8E85-59536FC7A696}"/>
+              </a:ext>
+            </a:extLst>
+          </p:cNvPr>
+          <p:cNvCxnSpPr>
+            <a:cxnSpLocks/>
+            <a:endCxn id="6" idx="3"/>
+          </p:cNvCxnSpPr>
+          <p:nvPr/>
+        </p:nvCxnSpPr>
+        <p:spPr>
+          <a:xfrm flipH="1">
+            <a:off x="4632737" y="2179149"/>
+            <a:ext cx="2009363" cy="78063"/>
+          </a:xfrm>
+          <a:prstGeom prst="line">
+            <a:avLst/>
+          </a:prstGeom>
+          <a:ln>
+            <a:solidFill>
+              <a:schemeClr val="bg2">
+                <a:lumMod val="25000"/>
+              </a:schemeClr>
+            </a:solidFill>
+          </a:ln>
+        </p:spPr>
+        <p:style>
+          <a:lnRef idx="1">
+            <a:schemeClr val="dk1"/>
+          </a:lnRef>
+          <a:fillRef idx="0">
+            <a:schemeClr val="dk1"/>
+          </a:fillRef>
+          <a:effectRef idx="0">
+            <a:schemeClr val="dk1"/>
+          </a:effectRef>
+          <a:fontRef idx="minor">
+            <a:schemeClr val="tx1"/>
+          </a:fontRef>
+        </p:style>
+      </p:cxnSp>
+      <p:sp>
+        <p:nvSpPr>
+          <p:cNvPr id="6" name="TextBox 5">
+            <a:extLst>
+              <a:ext uri="{FF2B5EF4-FFF2-40B4-BE49-F238E27FC236}">
+                <a16:creationId xmlns:a16="http://schemas.microsoft.com/office/drawing/2014/main" id="{DB375892-4516-4183-B782-A74D9BDE94B7}"/>
+              </a:ext>
+            </a:extLst>
+          </p:cNvPr>
+          <p:cNvSpPr txBox="1"/>
+          <p:nvPr/>
+        </p:nvSpPr>
+        <p:spPr>
+          <a:xfrm>
+            <a:off x="1107658" y="2072546"/>
+            <a:ext cx="3525079" cy="369332"/>
+          </a:xfrm>
+          <a:prstGeom prst="rect">
+            <a:avLst/>
+          </a:prstGeom>
+          <a:noFill/>
+        </p:spPr>
+        <p:txBody>
+          <a:bodyPr wrap="square" rtlCol="0">
+            <a:spAutoFit/>
+          </a:bodyPr>
+          <a:lstStyle/>
+          <a:p>
+            <a:pPr algn="r"/>
+            <a:r>
+              <a:rPr lang="en-US" dirty="0">
+                <a:latin typeface="CountryBlueprint" panose="00000400000000000000" pitchFamily="2" charset="2"/>
+                <a:ea typeface="Dotum" panose="020B0503020000020004" pitchFamily="34" charset="-127"/>
+              </a:rPr>
+              <a:t>Solar Panel</a:t>
+            </a:r>
+            <a:endParaRPr lang="en-GB" dirty="0">
+              <a:latin typeface="CountryBlueprint" panose="00000400000000000000" pitchFamily="2" charset="2"/>
+              <a:ea typeface="Dotum" panose="020B0503020000020004" pitchFamily="34" charset="-127"/>
+            </a:endParaRPr>
+          </a:p>
+        </p:txBody>
+      </p:sp>
+      <p:cxnSp>
+        <p:nvCxnSpPr>
+          <p:cNvPr id="7" name="Straight Connector 6">
+            <a:extLst>
+              <a:ext uri="{FF2B5EF4-FFF2-40B4-BE49-F238E27FC236}">
+                <a16:creationId xmlns:a16="http://schemas.microsoft.com/office/drawing/2014/main" id="{C0F78D54-531E-4218-82C3-0EC4380AC6C3}"/>
+              </a:ext>
+            </a:extLst>
+          </p:cNvPr>
+          <p:cNvCxnSpPr>
+            <a:cxnSpLocks/>
+            <a:endCxn id="8" idx="3"/>
+          </p:cNvCxnSpPr>
+          <p:nvPr/>
+        </p:nvCxnSpPr>
+        <p:spPr>
+          <a:xfrm flipH="1">
+            <a:off x="4632737" y="3752166"/>
+            <a:ext cx="1272763" cy="0"/>
+          </a:xfrm>
+          <a:prstGeom prst="line">
+            <a:avLst/>
+          </a:prstGeom>
+          <a:ln>
+            <a:solidFill>
+              <a:schemeClr val="bg2">
+                <a:lumMod val="25000"/>
+              </a:schemeClr>
+            </a:solidFill>
+          </a:ln>
+        </p:spPr>
+        <p:style>
+          <a:lnRef idx="1">
+            <a:schemeClr val="dk1"/>
+          </a:lnRef>
+          <a:fillRef idx="0">
+            <a:schemeClr val="dk1"/>
+          </a:fillRef>
+          <a:effectRef idx="0">
+            <a:schemeClr val="dk1"/>
+          </a:effectRef>
+          <a:fontRef idx="minor">
+            <a:schemeClr val="tx1"/>
+          </a:fontRef>
+        </p:style>
+      </p:cxnSp>
+      <p:sp>
+        <p:nvSpPr>
+          <p:cNvPr id="8" name="TextBox 7">
+            <a:extLst>
+              <a:ext uri="{FF2B5EF4-FFF2-40B4-BE49-F238E27FC236}">
+                <a16:creationId xmlns:a16="http://schemas.microsoft.com/office/drawing/2014/main" id="{9C088B0D-9D15-4CAB-8805-010A46A17906}"/>
+              </a:ext>
+            </a:extLst>
+          </p:cNvPr>
+          <p:cNvSpPr txBox="1"/>
+          <p:nvPr/>
+        </p:nvSpPr>
+        <p:spPr>
+          <a:xfrm>
+            <a:off x="1107658" y="3429000"/>
+            <a:ext cx="3525079" cy="646331"/>
+          </a:xfrm>
+          <a:prstGeom prst="rect">
+            <a:avLst/>
+          </a:prstGeom>
+          <a:noFill/>
+        </p:spPr>
+        <p:txBody>
+          <a:bodyPr wrap="square" rtlCol="0">
+            <a:spAutoFit/>
+          </a:bodyPr>
+          <a:lstStyle/>
+          <a:p>
+            <a:r>
+              <a:rPr lang="en-US" dirty="0">
+                <a:latin typeface="CountryBlueprint" panose="00000400000000000000" pitchFamily="2" charset="2"/>
+                <a:ea typeface="Dotum" panose="020B0503020000020004" pitchFamily="34" charset="-127"/>
+              </a:rPr>
+              <a:t>Electronics and sensors mounted vertically inside chimney</a:t>
+            </a:r>
+            <a:endParaRPr lang="en-GB" dirty="0">
+              <a:latin typeface="CountryBlueprint" panose="00000400000000000000" pitchFamily="2" charset="2"/>
+              <a:ea typeface="Dotum" panose="020B0503020000020004" pitchFamily="34" charset="-127"/>
+            </a:endParaRPr>
+          </a:p>
+        </p:txBody>
+      </p:sp>
+      <p:cxnSp>
+        <p:nvCxnSpPr>
+          <p:cNvPr id="9" name="Straight Connector 8">
+            <a:extLst>
+              <a:ext uri="{FF2B5EF4-FFF2-40B4-BE49-F238E27FC236}">
+                <a16:creationId xmlns:a16="http://schemas.microsoft.com/office/drawing/2014/main" id="{BF908616-B6A2-4EC9-B9BE-00A0992B0B71}"/>
+              </a:ext>
+            </a:extLst>
+          </p:cNvPr>
+          <p:cNvCxnSpPr>
+            <a:cxnSpLocks/>
+            <a:endCxn id="10" idx="3"/>
+          </p:cNvCxnSpPr>
+          <p:nvPr/>
+        </p:nvCxnSpPr>
+        <p:spPr>
+          <a:xfrm flipH="1">
+            <a:off x="4632737" y="4353847"/>
+            <a:ext cx="1717264" cy="520419"/>
+          </a:xfrm>
+          <a:prstGeom prst="line">
+            <a:avLst/>
+          </a:prstGeom>
+          <a:ln>
+            <a:solidFill>
+              <a:schemeClr val="bg2">
+                <a:lumMod val="25000"/>
+              </a:schemeClr>
+            </a:solidFill>
+          </a:ln>
+        </p:spPr>
+        <p:style>
+          <a:lnRef idx="1">
+            <a:schemeClr val="dk1"/>
+          </a:lnRef>
+          <a:fillRef idx="0">
+            <a:schemeClr val="dk1"/>
+          </a:fillRef>
+          <a:effectRef idx="0">
+            <a:schemeClr val="dk1"/>
+          </a:effectRef>
+          <a:fontRef idx="minor">
+            <a:schemeClr val="tx1"/>
+          </a:fontRef>
+        </p:style>
+      </p:cxnSp>
+      <p:sp>
+        <p:nvSpPr>
+          <p:cNvPr id="10" name="TextBox 9">
+            <a:extLst>
+              <a:ext uri="{FF2B5EF4-FFF2-40B4-BE49-F238E27FC236}">
+                <a16:creationId xmlns:a16="http://schemas.microsoft.com/office/drawing/2014/main" id="{DB31F01F-55DC-4ED2-9BDD-F62CB665A5E4}"/>
+              </a:ext>
+            </a:extLst>
+          </p:cNvPr>
+          <p:cNvSpPr txBox="1"/>
+          <p:nvPr/>
+        </p:nvSpPr>
+        <p:spPr>
+          <a:xfrm>
+            <a:off x="1107658" y="4551100"/>
+            <a:ext cx="3525079" cy="646331"/>
+          </a:xfrm>
+          <a:prstGeom prst="rect">
+            <a:avLst/>
+          </a:prstGeom>
+          <a:noFill/>
+        </p:spPr>
+        <p:txBody>
+          <a:bodyPr wrap="square" rtlCol="0">
+            <a:spAutoFit/>
+          </a:bodyPr>
+          <a:lstStyle/>
+          <a:p>
+            <a:r>
+              <a:rPr lang="en-US" dirty="0">
+                <a:latin typeface="CountryBlueprint" panose="00000400000000000000" pitchFamily="2" charset="2"/>
+                <a:ea typeface="Dotum" panose="020B0503020000020004" pitchFamily="34" charset="-127"/>
+              </a:rPr>
+              <a:t>Underside of sensor air permeable mesh</a:t>
+            </a:r>
+            <a:endParaRPr lang="en-GB" dirty="0">
+              <a:latin typeface="CountryBlueprint" panose="00000400000000000000" pitchFamily="2" charset="2"/>
+              <a:ea typeface="Dotum" panose="020B0503020000020004" pitchFamily="34" charset="-127"/>
+            </a:endParaRPr>
+          </a:p>
+        </p:txBody>
+      </p:sp>
+    </p:spTree>
+    <p:extLst>
+      <p:ext uri="{BB962C8B-B14F-4D97-AF65-F5344CB8AC3E}">
+        <p14:creationId xmlns:p14="http://schemas.microsoft.com/office/powerpoint/2010/main" val="4069016937"/>
       </p:ext>
     </p:extLst>
   </p:cSld>

</xml_diff>

<commit_message>
added some more figures to engineering section
</commit_message>
<xml_diff>
--- a/Written Report/Engineering_hardware/Engineering_hardware_Figures/engineering_figures_ppt.pptx
+++ b/Written Report/Engineering_hardware/Engineering_hardware_Figures/engineering_figures_ppt.pptx
@@ -9,6 +9,8 @@
     <p:sldId id="259" r:id="rId3"/>
     <p:sldId id="260" r:id="rId4"/>
     <p:sldId id="261" r:id="rId5"/>
+    <p:sldId id="262" r:id="rId6"/>
+    <p:sldId id="263" r:id="rId7"/>
   </p:sldIdLst>
   <p:sldSz cx="12192000" cy="6858000"/>
   <p:notesSz cx="6858000" cy="9144000"/>
@@ -264,7 +266,7 @@
           <a:p>
             <a:fld id="{E2017EB5-B5DD-4F61-91D8-732EF0B40DDC}" type="datetimeFigureOut">
               <a:rPr lang="en-GB" smtClean="0"/>
-              <a:t>02/05/2020</a:t>
+              <a:t>06/05/2020</a:t>
             </a:fld>
             <a:endParaRPr lang="en-GB"/>
           </a:p>
@@ -464,7 +466,7 @@
           <a:p>
             <a:fld id="{E2017EB5-B5DD-4F61-91D8-732EF0B40DDC}" type="datetimeFigureOut">
               <a:rPr lang="en-GB" smtClean="0"/>
-              <a:t>02/05/2020</a:t>
+              <a:t>06/05/2020</a:t>
             </a:fld>
             <a:endParaRPr lang="en-GB"/>
           </a:p>
@@ -674,7 +676,7 @@
           <a:p>
             <a:fld id="{E2017EB5-B5DD-4F61-91D8-732EF0B40DDC}" type="datetimeFigureOut">
               <a:rPr lang="en-GB" smtClean="0"/>
-              <a:t>02/05/2020</a:t>
+              <a:t>06/05/2020</a:t>
             </a:fld>
             <a:endParaRPr lang="en-GB"/>
           </a:p>
@@ -874,7 +876,7 @@
           <a:p>
             <a:fld id="{E2017EB5-B5DD-4F61-91D8-732EF0B40DDC}" type="datetimeFigureOut">
               <a:rPr lang="en-GB" smtClean="0"/>
-              <a:t>02/05/2020</a:t>
+              <a:t>06/05/2020</a:t>
             </a:fld>
             <a:endParaRPr lang="en-GB"/>
           </a:p>
@@ -1150,7 +1152,7 @@
           <a:p>
             <a:fld id="{E2017EB5-B5DD-4F61-91D8-732EF0B40DDC}" type="datetimeFigureOut">
               <a:rPr lang="en-GB" smtClean="0"/>
-              <a:t>02/05/2020</a:t>
+              <a:t>06/05/2020</a:t>
             </a:fld>
             <a:endParaRPr lang="en-GB"/>
           </a:p>
@@ -1418,7 +1420,7 @@
           <a:p>
             <a:fld id="{E2017EB5-B5DD-4F61-91D8-732EF0B40DDC}" type="datetimeFigureOut">
               <a:rPr lang="en-GB" smtClean="0"/>
-              <a:t>02/05/2020</a:t>
+              <a:t>06/05/2020</a:t>
             </a:fld>
             <a:endParaRPr lang="en-GB"/>
           </a:p>
@@ -1833,7 +1835,7 @@
           <a:p>
             <a:fld id="{E2017EB5-B5DD-4F61-91D8-732EF0B40DDC}" type="datetimeFigureOut">
               <a:rPr lang="en-GB" smtClean="0"/>
-              <a:t>02/05/2020</a:t>
+              <a:t>06/05/2020</a:t>
             </a:fld>
             <a:endParaRPr lang="en-GB"/>
           </a:p>
@@ -1975,7 +1977,7 @@
           <a:p>
             <a:fld id="{E2017EB5-B5DD-4F61-91D8-732EF0B40DDC}" type="datetimeFigureOut">
               <a:rPr lang="en-GB" smtClean="0"/>
-              <a:t>02/05/2020</a:t>
+              <a:t>06/05/2020</a:t>
             </a:fld>
             <a:endParaRPr lang="en-GB"/>
           </a:p>
@@ -2088,7 +2090,7 @@
           <a:p>
             <a:fld id="{E2017EB5-B5DD-4F61-91D8-732EF0B40DDC}" type="datetimeFigureOut">
               <a:rPr lang="en-GB" smtClean="0"/>
-              <a:t>02/05/2020</a:t>
+              <a:t>06/05/2020</a:t>
             </a:fld>
             <a:endParaRPr lang="en-GB"/>
           </a:p>
@@ -2401,7 +2403,7 @@
           <a:p>
             <a:fld id="{E2017EB5-B5DD-4F61-91D8-732EF0B40DDC}" type="datetimeFigureOut">
               <a:rPr lang="en-GB" smtClean="0"/>
-              <a:t>02/05/2020</a:t>
+              <a:t>06/05/2020</a:t>
             </a:fld>
             <a:endParaRPr lang="en-GB"/>
           </a:p>
@@ -2690,7 +2692,7 @@
           <a:p>
             <a:fld id="{E2017EB5-B5DD-4F61-91D8-732EF0B40DDC}" type="datetimeFigureOut">
               <a:rPr lang="en-GB" smtClean="0"/>
-              <a:t>02/05/2020</a:t>
+              <a:t>06/05/2020</a:t>
             </a:fld>
             <a:endParaRPr lang="en-GB"/>
           </a:p>
@@ -2933,7 +2935,7 @@
           <a:p>
             <a:fld id="{E2017EB5-B5DD-4F61-91D8-732EF0B40DDC}" type="datetimeFigureOut">
               <a:rPr lang="en-GB" smtClean="0"/>
-              <a:t>02/05/2020</a:t>
+              <a:t>06/05/2020</a:t>
             </a:fld>
             <a:endParaRPr lang="en-GB"/>
           </a:p>
@@ -5025,6 +5027,874 @@
 </p:sld>
 </file>
 
+<file path=ppt/slides/slide5.xml><?xml version="1.0" encoding="utf-8"?>
+<p:sld xmlns:a="http://schemas.openxmlformats.org/drawingml/2006/main" xmlns:r="http://schemas.openxmlformats.org/officeDocument/2006/relationships" xmlns:p="http://schemas.openxmlformats.org/presentationml/2006/main">
+  <p:cSld>
+    <p:spTree>
+      <p:nvGrpSpPr>
+        <p:cNvPr id="1" name=""/>
+        <p:cNvGrpSpPr/>
+        <p:nvPr/>
+      </p:nvGrpSpPr>
+      <p:grpSpPr>
+        <a:xfrm>
+          <a:off x="0" y="0"/>
+          <a:ext cx="0" cy="0"/>
+          <a:chOff x="0" y="0"/>
+          <a:chExt cx="0" cy="0"/>
+        </a:xfrm>
+      </p:grpSpPr>
+      <p:pic>
+        <p:nvPicPr>
+          <p:cNvPr id="5" name="Content Placeholder 4" descr="A picture containing indoor, sitting, table, small&#10;&#10;Description automatically generated">
+            <a:extLst>
+              <a:ext uri="{FF2B5EF4-FFF2-40B4-BE49-F238E27FC236}">
+                <a16:creationId xmlns:a16="http://schemas.microsoft.com/office/drawing/2014/main" id="{CAF59D62-427E-4B5F-BAC7-7126A5AEF6DB}"/>
+              </a:ext>
+            </a:extLst>
+          </p:cNvPr>
+          <p:cNvPicPr>
+            <a:picLocks noGrp="1" noChangeAspect="1"/>
+          </p:cNvPicPr>
+          <p:nvPr>
+            <p:ph idx="1"/>
+          </p:nvPr>
+        </p:nvPicPr>
+        <p:blipFill>
+          <a:blip r:embed="rId2">
+            <a:extLst>
+              <a:ext uri="{28A0092B-C50C-407E-A947-70E740481C1C}">
+                <a14:useLocalDpi xmlns:a14="http://schemas.microsoft.com/office/drawing/2010/main" val="0"/>
+              </a:ext>
+            </a:extLst>
+          </a:blip>
+          <a:stretch>
+            <a:fillRect/>
+          </a:stretch>
+        </p:blipFill>
+        <p:spPr>
+          <a:xfrm>
+            <a:off x="2545750" y="1253330"/>
+            <a:ext cx="6770527" cy="5077895"/>
+          </a:xfrm>
+        </p:spPr>
+      </p:pic>
+      <p:sp>
+        <p:nvSpPr>
+          <p:cNvPr id="6" name="Rectangle 5">
+            <a:extLst>
+              <a:ext uri="{FF2B5EF4-FFF2-40B4-BE49-F238E27FC236}">
+                <a16:creationId xmlns:a16="http://schemas.microsoft.com/office/drawing/2014/main" id="{C0A28803-DD7F-45BE-93ED-E8299C11B350}"/>
+              </a:ext>
+            </a:extLst>
+          </p:cNvPr>
+          <p:cNvSpPr/>
+          <p:nvPr/>
+        </p:nvSpPr>
+        <p:spPr>
+          <a:xfrm>
+            <a:off x="2665019" y="1457737"/>
+            <a:ext cx="1934817" cy="1073427"/>
+          </a:xfrm>
+          <a:prstGeom prst="rect">
+            <a:avLst/>
+          </a:prstGeom>
+        </p:spPr>
+        <p:style>
+          <a:lnRef idx="2">
+            <a:schemeClr val="accent6"/>
+          </a:lnRef>
+          <a:fillRef idx="1">
+            <a:schemeClr val="lt1"/>
+          </a:fillRef>
+          <a:effectRef idx="0">
+            <a:schemeClr val="accent6"/>
+          </a:effectRef>
+          <a:fontRef idx="minor">
+            <a:schemeClr val="dk1"/>
+          </a:fontRef>
+        </p:style>
+        <p:txBody>
+          <a:bodyPr rtlCol="0" anchor="ctr"/>
+          <a:lstStyle/>
+          <a:p>
+            <a:pPr algn="ctr"/>
+            <a:r>
+              <a:rPr lang="en-US" dirty="0"/>
+              <a:t>Turnigy 2200 mAH LI-PO Battery</a:t>
+            </a:r>
+            <a:endParaRPr lang="en-GB" dirty="0"/>
+          </a:p>
+        </p:txBody>
+      </p:sp>
+      <p:sp>
+        <p:nvSpPr>
+          <p:cNvPr id="7" name="Rectangle 6">
+            <a:extLst>
+              <a:ext uri="{FF2B5EF4-FFF2-40B4-BE49-F238E27FC236}">
+                <a16:creationId xmlns:a16="http://schemas.microsoft.com/office/drawing/2014/main" id="{FCB89228-BA68-4003-8CEC-0D7FC902F0B8}"/>
+              </a:ext>
+            </a:extLst>
+          </p:cNvPr>
+          <p:cNvSpPr/>
+          <p:nvPr/>
+        </p:nvSpPr>
+        <p:spPr>
+          <a:xfrm>
+            <a:off x="2749828" y="5067956"/>
+            <a:ext cx="1934817" cy="1073427"/>
+          </a:xfrm>
+          <a:prstGeom prst="rect">
+            <a:avLst/>
+          </a:prstGeom>
+        </p:spPr>
+        <p:style>
+          <a:lnRef idx="2">
+            <a:schemeClr val="accent6"/>
+          </a:lnRef>
+          <a:fillRef idx="1">
+            <a:schemeClr val="lt1"/>
+          </a:fillRef>
+          <a:effectRef idx="0">
+            <a:schemeClr val="accent6"/>
+          </a:effectRef>
+          <a:fontRef idx="minor">
+            <a:schemeClr val="dk1"/>
+          </a:fontRef>
+        </p:style>
+        <p:txBody>
+          <a:bodyPr rtlCol="0" anchor="ctr"/>
+          <a:lstStyle/>
+          <a:p>
+            <a:pPr algn="ctr"/>
+            <a:r>
+              <a:rPr lang="en-US" dirty="0"/>
+              <a:t>Turnigy 8-26V input 5V output SBEC </a:t>
+            </a:r>
+            <a:endParaRPr lang="en-GB" dirty="0"/>
+          </a:p>
+        </p:txBody>
+      </p:sp>
+      <p:sp>
+        <p:nvSpPr>
+          <p:cNvPr id="8" name="Rectangle 7">
+            <a:extLst>
+              <a:ext uri="{FF2B5EF4-FFF2-40B4-BE49-F238E27FC236}">
+                <a16:creationId xmlns:a16="http://schemas.microsoft.com/office/drawing/2014/main" id="{3CD07B88-9275-471E-BFA0-2454B66D8C38}"/>
+              </a:ext>
+            </a:extLst>
+          </p:cNvPr>
+          <p:cNvSpPr/>
+          <p:nvPr/>
+        </p:nvSpPr>
+        <p:spPr>
+          <a:xfrm>
+            <a:off x="8804737" y="3343860"/>
+            <a:ext cx="1934817" cy="1073427"/>
+          </a:xfrm>
+          <a:prstGeom prst="rect">
+            <a:avLst/>
+          </a:prstGeom>
+        </p:spPr>
+        <p:style>
+          <a:lnRef idx="2">
+            <a:schemeClr val="accent6"/>
+          </a:lnRef>
+          <a:fillRef idx="1">
+            <a:schemeClr val="lt1"/>
+          </a:fillRef>
+          <a:effectRef idx="0">
+            <a:schemeClr val="accent6"/>
+          </a:effectRef>
+          <a:fontRef idx="minor">
+            <a:schemeClr val="dk1"/>
+          </a:fontRef>
+        </p:style>
+        <p:txBody>
+          <a:bodyPr rtlCol="0" anchor="ctr"/>
+          <a:lstStyle/>
+          <a:p>
+            <a:pPr algn="ctr"/>
+            <a:r>
+              <a:rPr lang="en-US" dirty="0"/>
+              <a:t>Adafruit 6V Solar Panel</a:t>
+            </a:r>
+            <a:endParaRPr lang="en-GB" dirty="0"/>
+          </a:p>
+        </p:txBody>
+      </p:sp>
+      <p:sp>
+        <p:nvSpPr>
+          <p:cNvPr id="9" name="Rectangle 8">
+            <a:extLst>
+              <a:ext uri="{FF2B5EF4-FFF2-40B4-BE49-F238E27FC236}">
+                <a16:creationId xmlns:a16="http://schemas.microsoft.com/office/drawing/2014/main" id="{C8EA5E88-11DA-440C-8AE8-E3010857B16F}"/>
+              </a:ext>
+            </a:extLst>
+          </p:cNvPr>
+          <p:cNvSpPr/>
+          <p:nvPr/>
+        </p:nvSpPr>
+        <p:spPr>
+          <a:xfrm>
+            <a:off x="8474764" y="5067956"/>
+            <a:ext cx="1934817" cy="1073427"/>
+          </a:xfrm>
+          <a:prstGeom prst="rect">
+            <a:avLst/>
+          </a:prstGeom>
+        </p:spPr>
+        <p:style>
+          <a:lnRef idx="2">
+            <a:schemeClr val="accent6"/>
+          </a:lnRef>
+          <a:fillRef idx="1">
+            <a:schemeClr val="lt1"/>
+          </a:fillRef>
+          <a:effectRef idx="0">
+            <a:schemeClr val="accent6"/>
+          </a:effectRef>
+          <a:fontRef idx="minor">
+            <a:schemeClr val="dk1"/>
+          </a:fontRef>
+        </p:style>
+        <p:txBody>
+          <a:bodyPr rtlCol="0" anchor="ctr"/>
+          <a:lstStyle/>
+          <a:p>
+            <a:pPr algn="ctr"/>
+            <a:r>
+              <a:rPr lang="en-US" dirty="0"/>
+              <a:t>19mm Steel ball transfer unit</a:t>
+            </a:r>
+            <a:endParaRPr lang="en-GB" dirty="0"/>
+          </a:p>
+        </p:txBody>
+      </p:sp>
+      <p:cxnSp>
+        <p:nvCxnSpPr>
+          <p:cNvPr id="11" name="Straight Arrow Connector 10">
+            <a:extLst>
+              <a:ext uri="{FF2B5EF4-FFF2-40B4-BE49-F238E27FC236}">
+                <a16:creationId xmlns:a16="http://schemas.microsoft.com/office/drawing/2014/main" id="{5D144F49-4BFC-4FB9-9351-9EF1314D3A09}"/>
+              </a:ext>
+            </a:extLst>
+          </p:cNvPr>
+          <p:cNvCxnSpPr>
+            <a:stCxn id="6" idx="3"/>
+          </p:cNvCxnSpPr>
+          <p:nvPr/>
+        </p:nvCxnSpPr>
+        <p:spPr>
+          <a:xfrm>
+            <a:off x="4599836" y="1994451"/>
+            <a:ext cx="1331177" cy="1349409"/>
+          </a:xfrm>
+          <a:prstGeom prst="straightConnector1">
+            <a:avLst/>
+          </a:prstGeom>
+          <a:ln w="38100">
+            <a:solidFill>
+              <a:srgbClr val="FFC000"/>
+            </a:solidFill>
+            <a:tailEnd type="triangle"/>
+          </a:ln>
+        </p:spPr>
+        <p:style>
+          <a:lnRef idx="1">
+            <a:schemeClr val="accent1"/>
+          </a:lnRef>
+          <a:fillRef idx="0">
+            <a:schemeClr val="accent1"/>
+          </a:fillRef>
+          <a:effectRef idx="0">
+            <a:schemeClr val="accent1"/>
+          </a:effectRef>
+          <a:fontRef idx="minor">
+            <a:schemeClr val="tx1"/>
+          </a:fontRef>
+        </p:style>
+      </p:cxnSp>
+      <p:cxnSp>
+        <p:nvCxnSpPr>
+          <p:cNvPr id="13" name="Straight Arrow Connector 12">
+            <a:extLst>
+              <a:ext uri="{FF2B5EF4-FFF2-40B4-BE49-F238E27FC236}">
+                <a16:creationId xmlns:a16="http://schemas.microsoft.com/office/drawing/2014/main" id="{8B3CFC79-1627-4467-9788-E98D7C420C87}"/>
+              </a:ext>
+            </a:extLst>
+          </p:cNvPr>
+          <p:cNvCxnSpPr/>
+          <p:nvPr/>
+        </p:nvCxnSpPr>
+        <p:spPr>
+          <a:xfrm flipH="1" flipV="1">
+            <a:off x="8587409" y="3525078"/>
+            <a:ext cx="217328" cy="355495"/>
+          </a:xfrm>
+          <a:prstGeom prst="straightConnector1">
+            <a:avLst/>
+          </a:prstGeom>
+          <a:ln w="38100">
+            <a:solidFill>
+              <a:srgbClr val="FFC000"/>
+            </a:solidFill>
+            <a:tailEnd type="triangle"/>
+          </a:ln>
+        </p:spPr>
+        <p:style>
+          <a:lnRef idx="1">
+            <a:schemeClr val="accent1"/>
+          </a:lnRef>
+          <a:fillRef idx="0">
+            <a:schemeClr val="accent1"/>
+          </a:fillRef>
+          <a:effectRef idx="0">
+            <a:schemeClr val="accent1"/>
+          </a:effectRef>
+          <a:fontRef idx="minor">
+            <a:schemeClr val="tx1"/>
+          </a:fontRef>
+        </p:style>
+      </p:cxnSp>
+      <p:cxnSp>
+        <p:nvCxnSpPr>
+          <p:cNvPr id="15" name="Straight Arrow Connector 14">
+            <a:extLst>
+              <a:ext uri="{FF2B5EF4-FFF2-40B4-BE49-F238E27FC236}">
+                <a16:creationId xmlns:a16="http://schemas.microsoft.com/office/drawing/2014/main" id="{E42C9EFA-F721-4FBF-9200-D3245309BBD8}"/>
+              </a:ext>
+            </a:extLst>
+          </p:cNvPr>
+          <p:cNvCxnSpPr>
+            <a:stCxn id="7" idx="3"/>
+          </p:cNvCxnSpPr>
+          <p:nvPr/>
+        </p:nvCxnSpPr>
+        <p:spPr>
+          <a:xfrm flipV="1">
+            <a:off x="4684645" y="3343860"/>
+            <a:ext cx="470451" cy="2260810"/>
+          </a:xfrm>
+          <a:prstGeom prst="straightConnector1">
+            <a:avLst/>
+          </a:prstGeom>
+          <a:ln w="38100">
+            <a:solidFill>
+              <a:srgbClr val="FFC000"/>
+            </a:solidFill>
+            <a:tailEnd type="triangle"/>
+          </a:ln>
+        </p:spPr>
+        <p:style>
+          <a:lnRef idx="1">
+            <a:schemeClr val="accent1"/>
+          </a:lnRef>
+          <a:fillRef idx="0">
+            <a:schemeClr val="accent1"/>
+          </a:fillRef>
+          <a:effectRef idx="0">
+            <a:schemeClr val="accent1"/>
+          </a:effectRef>
+          <a:fontRef idx="minor">
+            <a:schemeClr val="tx1"/>
+          </a:fontRef>
+        </p:style>
+      </p:cxnSp>
+      <p:cxnSp>
+        <p:nvCxnSpPr>
+          <p:cNvPr id="17" name="Straight Arrow Connector 16">
+            <a:extLst>
+              <a:ext uri="{FF2B5EF4-FFF2-40B4-BE49-F238E27FC236}">
+                <a16:creationId xmlns:a16="http://schemas.microsoft.com/office/drawing/2014/main" id="{E0D06F57-5654-4798-AB75-CF212DBD7128}"/>
+              </a:ext>
+            </a:extLst>
+          </p:cNvPr>
+          <p:cNvCxnSpPr>
+            <a:stCxn id="9" idx="1"/>
+          </p:cNvCxnSpPr>
+          <p:nvPr/>
+        </p:nvCxnSpPr>
+        <p:spPr>
+          <a:xfrm flipH="1" flipV="1">
+            <a:off x="7593496" y="5067956"/>
+            <a:ext cx="881268" cy="536714"/>
+          </a:xfrm>
+          <a:prstGeom prst="straightConnector1">
+            <a:avLst/>
+          </a:prstGeom>
+          <a:ln w="38100">
+            <a:solidFill>
+              <a:srgbClr val="FFC000"/>
+            </a:solidFill>
+            <a:tailEnd type="triangle"/>
+          </a:ln>
+        </p:spPr>
+        <p:style>
+          <a:lnRef idx="1">
+            <a:schemeClr val="accent1"/>
+          </a:lnRef>
+          <a:fillRef idx="0">
+            <a:schemeClr val="accent1"/>
+          </a:fillRef>
+          <a:effectRef idx="0">
+            <a:schemeClr val="accent1"/>
+          </a:effectRef>
+          <a:fontRef idx="minor">
+            <a:schemeClr val="tx1"/>
+          </a:fontRef>
+        </p:style>
+      </p:cxnSp>
+    </p:spTree>
+    <p:extLst>
+      <p:ext uri="{BB962C8B-B14F-4D97-AF65-F5344CB8AC3E}">
+        <p14:creationId xmlns:p14="http://schemas.microsoft.com/office/powerpoint/2010/main" val="1232627976"/>
+      </p:ext>
+    </p:extLst>
+  </p:cSld>
+  <p:clrMapOvr>
+    <a:masterClrMapping/>
+  </p:clrMapOvr>
+</p:sld>
+</file>
+
+<file path=ppt/slides/slide6.xml><?xml version="1.0" encoding="utf-8"?>
+<p:sld xmlns:a="http://schemas.openxmlformats.org/drawingml/2006/main" xmlns:r="http://schemas.openxmlformats.org/officeDocument/2006/relationships" xmlns:p="http://schemas.openxmlformats.org/presentationml/2006/main">
+  <p:cSld>
+    <p:spTree>
+      <p:nvGrpSpPr>
+        <p:cNvPr id="1" name=""/>
+        <p:cNvGrpSpPr/>
+        <p:nvPr/>
+      </p:nvGrpSpPr>
+      <p:grpSpPr>
+        <a:xfrm>
+          <a:off x="0" y="0"/>
+          <a:ext cx="0" cy="0"/>
+          <a:chOff x="0" y="0"/>
+          <a:chExt cx="0" cy="0"/>
+        </a:xfrm>
+      </p:grpSpPr>
+      <p:pic>
+        <p:nvPicPr>
+          <p:cNvPr id="5" name="Picture 4">
+            <a:extLst>
+              <a:ext uri="{FF2B5EF4-FFF2-40B4-BE49-F238E27FC236}">
+                <a16:creationId xmlns:a16="http://schemas.microsoft.com/office/drawing/2014/main" id="{FEBB5A0D-9210-4B1A-B29F-AD55C0E48534}"/>
+              </a:ext>
+            </a:extLst>
+          </p:cNvPr>
+          <p:cNvPicPr>
+            <a:picLocks noChangeAspect="1"/>
+          </p:cNvPicPr>
+          <p:nvPr/>
+        </p:nvPicPr>
+        <p:blipFill>
+          <a:blip r:embed="rId2">
+            <a:extLst>
+              <a:ext uri="{28A0092B-C50C-407E-A947-70E740481C1C}">
+                <a14:useLocalDpi xmlns:a14="http://schemas.microsoft.com/office/drawing/2010/main" val="0"/>
+              </a:ext>
+            </a:extLst>
+          </a:blip>
+          <a:stretch>
+            <a:fillRect/>
+          </a:stretch>
+        </p:blipFill>
+        <p:spPr>
+          <a:xfrm>
+            <a:off x="1417983" y="566530"/>
+            <a:ext cx="7633252" cy="5724939"/>
+          </a:xfrm>
+          <a:prstGeom prst="rect">
+            <a:avLst/>
+          </a:prstGeom>
+        </p:spPr>
+      </p:pic>
+      <p:sp>
+        <p:nvSpPr>
+          <p:cNvPr id="6" name="Rectangle 5">
+            <a:extLst>
+              <a:ext uri="{FF2B5EF4-FFF2-40B4-BE49-F238E27FC236}">
+                <a16:creationId xmlns:a16="http://schemas.microsoft.com/office/drawing/2014/main" id="{4FFA1CD9-E2C7-47B2-8373-C23C1A69C973}"/>
+              </a:ext>
+            </a:extLst>
+          </p:cNvPr>
+          <p:cNvSpPr/>
+          <p:nvPr/>
+        </p:nvSpPr>
+        <p:spPr>
+          <a:xfrm>
+            <a:off x="836219" y="993911"/>
+            <a:ext cx="1934817" cy="1073427"/>
+          </a:xfrm>
+          <a:prstGeom prst="rect">
+            <a:avLst/>
+          </a:prstGeom>
+        </p:spPr>
+        <p:style>
+          <a:lnRef idx="2">
+            <a:schemeClr val="accent6"/>
+          </a:lnRef>
+          <a:fillRef idx="1">
+            <a:schemeClr val="lt1"/>
+          </a:fillRef>
+          <a:effectRef idx="0">
+            <a:schemeClr val="accent6"/>
+          </a:effectRef>
+          <a:fontRef idx="minor">
+            <a:schemeClr val="dk1"/>
+          </a:fontRef>
+        </p:style>
+        <p:txBody>
+          <a:bodyPr rtlCol="0" anchor="ctr"/>
+          <a:lstStyle/>
+          <a:p>
+            <a:pPr algn="ctr"/>
+            <a:r>
+              <a:rPr lang="en-US" dirty="0"/>
+              <a:t>Raspberry Pi 3 </a:t>
+            </a:r>
+            <a:endParaRPr lang="en-GB" dirty="0"/>
+          </a:p>
+        </p:txBody>
+      </p:sp>
+      <p:cxnSp>
+        <p:nvCxnSpPr>
+          <p:cNvPr id="7" name="Straight Arrow Connector 6">
+            <a:extLst>
+              <a:ext uri="{FF2B5EF4-FFF2-40B4-BE49-F238E27FC236}">
+                <a16:creationId xmlns:a16="http://schemas.microsoft.com/office/drawing/2014/main" id="{2597CD27-5346-4E76-A743-243ABD6C4BAD}"/>
+              </a:ext>
+            </a:extLst>
+          </p:cNvPr>
+          <p:cNvCxnSpPr>
+            <a:stCxn id="6" idx="3"/>
+          </p:cNvCxnSpPr>
+          <p:nvPr/>
+        </p:nvCxnSpPr>
+        <p:spPr>
+          <a:xfrm>
+            <a:off x="2771036" y="1530625"/>
+            <a:ext cx="1331177" cy="1349409"/>
+          </a:xfrm>
+          <a:prstGeom prst="straightConnector1">
+            <a:avLst/>
+          </a:prstGeom>
+          <a:ln w="38100">
+            <a:solidFill>
+              <a:srgbClr val="FFC000"/>
+            </a:solidFill>
+            <a:tailEnd type="triangle"/>
+          </a:ln>
+        </p:spPr>
+        <p:style>
+          <a:lnRef idx="1">
+            <a:schemeClr val="accent1"/>
+          </a:lnRef>
+          <a:fillRef idx="0">
+            <a:schemeClr val="accent1"/>
+          </a:fillRef>
+          <a:effectRef idx="0">
+            <a:schemeClr val="accent1"/>
+          </a:effectRef>
+          <a:fontRef idx="minor">
+            <a:schemeClr val="tx1"/>
+          </a:fontRef>
+        </p:style>
+      </p:cxnSp>
+      <p:sp>
+        <p:nvSpPr>
+          <p:cNvPr id="8" name="Rectangle 7">
+            <a:extLst>
+              <a:ext uri="{FF2B5EF4-FFF2-40B4-BE49-F238E27FC236}">
+                <a16:creationId xmlns:a16="http://schemas.microsoft.com/office/drawing/2014/main" id="{787CD3C2-3972-4F5D-BDE1-31E394671EDF}"/>
+              </a:ext>
+            </a:extLst>
+          </p:cNvPr>
+          <p:cNvSpPr/>
+          <p:nvPr/>
+        </p:nvSpPr>
+        <p:spPr>
+          <a:xfrm>
+            <a:off x="450574" y="4405346"/>
+            <a:ext cx="1934817" cy="1073427"/>
+          </a:xfrm>
+          <a:prstGeom prst="rect">
+            <a:avLst/>
+          </a:prstGeom>
+        </p:spPr>
+        <p:style>
+          <a:lnRef idx="2">
+            <a:schemeClr val="accent6"/>
+          </a:lnRef>
+          <a:fillRef idx="1">
+            <a:schemeClr val="lt1"/>
+          </a:fillRef>
+          <a:effectRef idx="0">
+            <a:schemeClr val="accent6"/>
+          </a:effectRef>
+          <a:fontRef idx="minor">
+            <a:schemeClr val="dk1"/>
+          </a:fontRef>
+        </p:style>
+        <p:txBody>
+          <a:bodyPr rtlCol="0" anchor="ctr"/>
+          <a:lstStyle/>
+          <a:p>
+            <a:pPr algn="ctr"/>
+            <a:r>
+              <a:rPr lang="en-US" dirty="0"/>
+              <a:t>SGP30 TVOC/eC02 gas sensor</a:t>
+            </a:r>
+            <a:endParaRPr lang="en-GB" dirty="0"/>
+          </a:p>
+        </p:txBody>
+      </p:sp>
+      <p:cxnSp>
+        <p:nvCxnSpPr>
+          <p:cNvPr id="9" name="Straight Arrow Connector 8">
+            <a:extLst>
+              <a:ext uri="{FF2B5EF4-FFF2-40B4-BE49-F238E27FC236}">
+                <a16:creationId xmlns:a16="http://schemas.microsoft.com/office/drawing/2014/main" id="{6B0CFDD4-430C-43B9-9C8B-55A28C93EE3A}"/>
+              </a:ext>
+            </a:extLst>
+          </p:cNvPr>
+          <p:cNvCxnSpPr>
+            <a:cxnSpLocks/>
+            <a:stCxn id="8" idx="3"/>
+          </p:cNvCxnSpPr>
+          <p:nvPr/>
+        </p:nvCxnSpPr>
+        <p:spPr>
+          <a:xfrm flipV="1">
+            <a:off x="2385391" y="4346714"/>
+            <a:ext cx="980661" cy="595346"/>
+          </a:xfrm>
+          <a:prstGeom prst="straightConnector1">
+            <a:avLst/>
+          </a:prstGeom>
+          <a:ln w="38100">
+            <a:solidFill>
+              <a:srgbClr val="FFC000"/>
+            </a:solidFill>
+            <a:tailEnd type="triangle"/>
+          </a:ln>
+        </p:spPr>
+        <p:style>
+          <a:lnRef idx="1">
+            <a:schemeClr val="accent1"/>
+          </a:lnRef>
+          <a:fillRef idx="0">
+            <a:schemeClr val="accent1"/>
+          </a:fillRef>
+          <a:effectRef idx="0">
+            <a:schemeClr val="accent1"/>
+          </a:effectRef>
+          <a:fontRef idx="minor">
+            <a:schemeClr val="tx1"/>
+          </a:fontRef>
+        </p:style>
+      </p:cxnSp>
+      <p:sp>
+        <p:nvSpPr>
+          <p:cNvPr id="11" name="Rectangle 10">
+            <a:extLst>
+              <a:ext uri="{FF2B5EF4-FFF2-40B4-BE49-F238E27FC236}">
+                <a16:creationId xmlns:a16="http://schemas.microsoft.com/office/drawing/2014/main" id="{00653D3A-EA26-42A4-BC77-DE76A75C5291}"/>
+              </a:ext>
+            </a:extLst>
+          </p:cNvPr>
+          <p:cNvSpPr/>
+          <p:nvPr/>
+        </p:nvSpPr>
+        <p:spPr>
+          <a:xfrm>
+            <a:off x="7534527" y="5218042"/>
+            <a:ext cx="1934817" cy="1073427"/>
+          </a:xfrm>
+          <a:prstGeom prst="rect">
+            <a:avLst/>
+          </a:prstGeom>
+        </p:spPr>
+        <p:style>
+          <a:lnRef idx="2">
+            <a:schemeClr val="accent6"/>
+          </a:lnRef>
+          <a:fillRef idx="1">
+            <a:schemeClr val="lt1"/>
+          </a:fillRef>
+          <a:effectRef idx="0">
+            <a:schemeClr val="accent6"/>
+          </a:effectRef>
+          <a:fontRef idx="minor">
+            <a:schemeClr val="dk1"/>
+          </a:fontRef>
+        </p:style>
+        <p:txBody>
+          <a:bodyPr rtlCol="0" anchor="ctr"/>
+          <a:lstStyle/>
+          <a:p>
+            <a:pPr algn="ctr"/>
+            <a:r>
+              <a:rPr lang="en-US" dirty="0"/>
+              <a:t>USB-C power cable</a:t>
+            </a:r>
+            <a:endParaRPr lang="en-GB" dirty="0"/>
+          </a:p>
+        </p:txBody>
+      </p:sp>
+      <p:cxnSp>
+        <p:nvCxnSpPr>
+          <p:cNvPr id="12" name="Straight Arrow Connector 11">
+            <a:extLst>
+              <a:ext uri="{FF2B5EF4-FFF2-40B4-BE49-F238E27FC236}">
+                <a16:creationId xmlns:a16="http://schemas.microsoft.com/office/drawing/2014/main" id="{5BEF867F-2626-4EB2-83BF-8CD2D12663DF}"/>
+              </a:ext>
+            </a:extLst>
+          </p:cNvPr>
+          <p:cNvCxnSpPr>
+            <a:cxnSpLocks/>
+            <a:stCxn id="11" idx="1"/>
+          </p:cNvCxnSpPr>
+          <p:nvPr/>
+        </p:nvCxnSpPr>
+        <p:spPr>
+          <a:xfrm flipH="1" flipV="1">
+            <a:off x="4102213" y="5102087"/>
+            <a:ext cx="3432314" cy="652669"/>
+          </a:xfrm>
+          <a:prstGeom prst="straightConnector1">
+            <a:avLst/>
+          </a:prstGeom>
+          <a:ln w="38100">
+            <a:solidFill>
+              <a:srgbClr val="FFC000"/>
+            </a:solidFill>
+            <a:tailEnd type="triangle"/>
+          </a:ln>
+        </p:spPr>
+        <p:style>
+          <a:lnRef idx="1">
+            <a:schemeClr val="accent1"/>
+          </a:lnRef>
+          <a:fillRef idx="0">
+            <a:schemeClr val="accent1"/>
+          </a:fillRef>
+          <a:effectRef idx="0">
+            <a:schemeClr val="accent1"/>
+          </a:effectRef>
+          <a:fontRef idx="minor">
+            <a:schemeClr val="tx1"/>
+          </a:fontRef>
+        </p:style>
+      </p:cxnSp>
+      <p:sp>
+        <p:nvSpPr>
+          <p:cNvPr id="15" name="Rectangle 14">
+            <a:extLst>
+              <a:ext uri="{FF2B5EF4-FFF2-40B4-BE49-F238E27FC236}">
+                <a16:creationId xmlns:a16="http://schemas.microsoft.com/office/drawing/2014/main" id="{0516F7CB-B56E-4442-A3D4-C44FA842E5A3}"/>
+              </a:ext>
+            </a:extLst>
+          </p:cNvPr>
+          <p:cNvSpPr/>
+          <p:nvPr/>
+        </p:nvSpPr>
+        <p:spPr>
+          <a:xfrm>
+            <a:off x="8089789" y="1412511"/>
+            <a:ext cx="1934817" cy="1073427"/>
+          </a:xfrm>
+          <a:prstGeom prst="rect">
+            <a:avLst/>
+          </a:prstGeom>
+        </p:spPr>
+        <p:style>
+          <a:lnRef idx="2">
+            <a:schemeClr val="accent6"/>
+          </a:lnRef>
+          <a:fillRef idx="1">
+            <a:schemeClr val="lt1"/>
+          </a:fillRef>
+          <a:effectRef idx="0">
+            <a:schemeClr val="accent6"/>
+          </a:effectRef>
+          <a:fontRef idx="minor">
+            <a:schemeClr val="dk1"/>
+          </a:fontRef>
+        </p:style>
+        <p:txBody>
+          <a:bodyPr rtlCol="0" anchor="ctr"/>
+          <a:lstStyle/>
+          <a:p>
+            <a:pPr algn="ctr"/>
+            <a:r>
+              <a:rPr lang="en-US" dirty="0"/>
+              <a:t>GPIO pins</a:t>
+            </a:r>
+            <a:endParaRPr lang="en-GB" dirty="0"/>
+          </a:p>
+        </p:txBody>
+      </p:sp>
+      <p:cxnSp>
+        <p:nvCxnSpPr>
+          <p:cNvPr id="16" name="Straight Arrow Connector 15">
+            <a:extLst>
+              <a:ext uri="{FF2B5EF4-FFF2-40B4-BE49-F238E27FC236}">
+                <a16:creationId xmlns:a16="http://schemas.microsoft.com/office/drawing/2014/main" id="{E9F683F7-BC1E-4494-93BE-37EBFA7063A6}"/>
+              </a:ext>
+            </a:extLst>
+          </p:cNvPr>
+          <p:cNvCxnSpPr>
+            <a:cxnSpLocks/>
+            <a:stCxn id="15" idx="1"/>
+          </p:cNvCxnSpPr>
+          <p:nvPr/>
+        </p:nvCxnSpPr>
+        <p:spPr>
+          <a:xfrm flipH="1">
+            <a:off x="4463004" y="1949225"/>
+            <a:ext cx="3626785" cy="369905"/>
+          </a:xfrm>
+          <a:prstGeom prst="straightConnector1">
+            <a:avLst/>
+          </a:prstGeom>
+          <a:ln w="38100">
+            <a:solidFill>
+              <a:srgbClr val="FFC000"/>
+            </a:solidFill>
+            <a:tailEnd type="triangle"/>
+          </a:ln>
+        </p:spPr>
+        <p:style>
+          <a:lnRef idx="1">
+            <a:schemeClr val="accent1"/>
+          </a:lnRef>
+          <a:fillRef idx="0">
+            <a:schemeClr val="accent1"/>
+          </a:fillRef>
+          <a:effectRef idx="0">
+            <a:schemeClr val="accent1"/>
+          </a:effectRef>
+          <a:fontRef idx="minor">
+            <a:schemeClr val="tx1"/>
+          </a:fontRef>
+        </p:style>
+      </p:cxnSp>
+    </p:spTree>
+    <p:extLst>
+      <p:ext uri="{BB962C8B-B14F-4D97-AF65-F5344CB8AC3E}">
+        <p14:creationId xmlns:p14="http://schemas.microsoft.com/office/powerpoint/2010/main" val="2734894429"/>
+      </p:ext>
+    </p:extLst>
+  </p:cSld>
+  <p:clrMapOvr>
+    <a:masterClrMapping/>
+  </p:clrMapOvr>
+</p:sld>
+</file>
+
 <file path=ppt/theme/theme1.xml><?xml version="1.0" encoding="utf-8"?>
 <a:theme xmlns:a="http://schemas.openxmlformats.org/drawingml/2006/main" name="Office Theme">
   <a:themeElements>

</xml_diff>

<commit_message>
added in FEA diagram
</commit_message>
<xml_diff>
--- a/Written Report/Engineering_hardware/Engineering_hardware_Figures/engineering_figures_ppt.pptx
+++ b/Written Report/Engineering_hardware/Engineering_hardware_Figures/engineering_figures_ppt.pptx
@@ -11,6 +11,7 @@
     <p:sldId id="261" r:id="rId5"/>
     <p:sldId id="262" r:id="rId6"/>
     <p:sldId id="263" r:id="rId7"/>
+    <p:sldId id="264" r:id="rId8"/>
   </p:sldIdLst>
   <p:sldSz cx="12192000" cy="6858000"/>
   <p:notesSz cx="6858000" cy="9144000"/>
@@ -5895,6 +5896,174 @@
 </p:sld>
 </file>
 
+<file path=ppt/slides/slide7.xml><?xml version="1.0" encoding="utf-8"?>
+<p:sld xmlns:a="http://schemas.openxmlformats.org/drawingml/2006/main" xmlns:r="http://schemas.openxmlformats.org/officeDocument/2006/relationships" xmlns:p="http://schemas.openxmlformats.org/presentationml/2006/main">
+  <p:cSld>
+    <p:spTree>
+      <p:nvGrpSpPr>
+        <p:cNvPr id="1" name=""/>
+        <p:cNvGrpSpPr/>
+        <p:nvPr/>
+      </p:nvGrpSpPr>
+      <p:grpSpPr>
+        <a:xfrm>
+          <a:off x="0" y="0"/>
+          <a:ext cx="0" cy="0"/>
+          <a:chOff x="0" y="0"/>
+          <a:chExt cx="0" cy="0"/>
+        </a:xfrm>
+      </p:grpSpPr>
+      <p:pic>
+        <p:nvPicPr>
+          <p:cNvPr id="4" name="Picture 3">
+            <a:extLst>
+              <a:ext uri="{FF2B5EF4-FFF2-40B4-BE49-F238E27FC236}">
+                <a16:creationId xmlns:a16="http://schemas.microsoft.com/office/drawing/2014/main" id="{53B226D7-9ED0-478C-BC6E-DB7E64B42075}"/>
+              </a:ext>
+            </a:extLst>
+          </p:cNvPr>
+          <p:cNvPicPr>
+            <a:picLocks noChangeAspect="1"/>
+          </p:cNvPicPr>
+          <p:nvPr/>
+        </p:nvPicPr>
+        <p:blipFill>
+          <a:blip r:embed="rId2"/>
+          <a:stretch>
+            <a:fillRect/>
+          </a:stretch>
+        </p:blipFill>
+        <p:spPr>
+          <a:xfrm>
+            <a:off x="2043112" y="614362"/>
+            <a:ext cx="8105775" cy="5629275"/>
+          </a:xfrm>
+          <a:prstGeom prst="rect">
+            <a:avLst/>
+          </a:prstGeom>
+        </p:spPr>
+      </p:pic>
+      <p:sp>
+        <p:nvSpPr>
+          <p:cNvPr id="5" name="TextBox 4">
+            <a:extLst>
+              <a:ext uri="{FF2B5EF4-FFF2-40B4-BE49-F238E27FC236}">
+                <a16:creationId xmlns:a16="http://schemas.microsoft.com/office/drawing/2014/main" id="{55608C44-B746-4BEA-88E4-F6546B70AE32}"/>
+              </a:ext>
+            </a:extLst>
+          </p:cNvPr>
+          <p:cNvSpPr txBox="1"/>
+          <p:nvPr/>
+        </p:nvSpPr>
+        <p:spPr>
+          <a:xfrm>
+            <a:off x="2447925" y="1581150"/>
+            <a:ext cx="1085850" cy="307777"/>
+          </a:xfrm>
+          <a:prstGeom prst="rect">
+            <a:avLst/>
+          </a:prstGeom>
+          <a:noFill/>
+        </p:spPr>
+        <p:txBody>
+          <a:bodyPr wrap="square" rtlCol="0">
+            <a:spAutoFit/>
+          </a:bodyPr>
+          <a:lstStyle/>
+          <a:p>
+            <a:r>
+              <a:rPr lang="en-US" sz="1400" dirty="0"/>
+              <a:t>0.436</a:t>
+            </a:r>
+            <a:endParaRPr lang="en-GB" sz="1400" dirty="0"/>
+          </a:p>
+        </p:txBody>
+      </p:sp>
+      <p:sp>
+        <p:nvSpPr>
+          <p:cNvPr id="6" name="TextBox 5">
+            <a:extLst>
+              <a:ext uri="{FF2B5EF4-FFF2-40B4-BE49-F238E27FC236}">
+                <a16:creationId xmlns:a16="http://schemas.microsoft.com/office/drawing/2014/main" id="{F0F03FD4-D92E-45F5-8538-C15FBBFC2255}"/>
+              </a:ext>
+            </a:extLst>
+          </p:cNvPr>
+          <p:cNvSpPr txBox="1"/>
+          <p:nvPr/>
+        </p:nvSpPr>
+        <p:spPr>
+          <a:xfrm>
+            <a:off x="2447925" y="5149334"/>
+            <a:ext cx="1085850" cy="307777"/>
+          </a:xfrm>
+          <a:prstGeom prst="rect">
+            <a:avLst/>
+          </a:prstGeom>
+          <a:noFill/>
+        </p:spPr>
+        <p:txBody>
+          <a:bodyPr wrap="square" rtlCol="0">
+            <a:spAutoFit/>
+          </a:bodyPr>
+          <a:lstStyle/>
+          <a:p>
+            <a:r>
+              <a:rPr lang="en-US" sz="1400" dirty="0"/>
+              <a:t>0.0</a:t>
+            </a:r>
+            <a:endParaRPr lang="en-GB" sz="1400" dirty="0"/>
+          </a:p>
+        </p:txBody>
+      </p:sp>
+      <p:sp>
+        <p:nvSpPr>
+          <p:cNvPr id="7" name="TextBox 6">
+            <a:extLst>
+              <a:ext uri="{FF2B5EF4-FFF2-40B4-BE49-F238E27FC236}">
+                <a16:creationId xmlns:a16="http://schemas.microsoft.com/office/drawing/2014/main" id="{D26AC003-CE82-4564-AC28-C278C2B7B291}"/>
+              </a:ext>
+            </a:extLst>
+          </p:cNvPr>
+          <p:cNvSpPr txBox="1"/>
+          <p:nvPr/>
+        </p:nvSpPr>
+        <p:spPr>
+          <a:xfrm>
+            <a:off x="2043112" y="1347311"/>
+            <a:ext cx="1709738" cy="307777"/>
+          </a:xfrm>
+          <a:prstGeom prst="rect">
+            <a:avLst/>
+          </a:prstGeom>
+          <a:noFill/>
+        </p:spPr>
+        <p:txBody>
+          <a:bodyPr wrap="square" rtlCol="0">
+            <a:spAutoFit/>
+          </a:bodyPr>
+          <a:lstStyle/>
+          <a:p>
+            <a:r>
+              <a:rPr lang="en-US" sz="1400" dirty="0"/>
+              <a:t>Displacement (mm)</a:t>
+            </a:r>
+            <a:endParaRPr lang="en-GB" sz="1400" dirty="0"/>
+          </a:p>
+        </p:txBody>
+      </p:sp>
+    </p:spTree>
+    <p:extLst>
+      <p:ext uri="{BB962C8B-B14F-4D97-AF65-F5344CB8AC3E}">
+        <p14:creationId xmlns:p14="http://schemas.microsoft.com/office/powerpoint/2010/main" val="2914375397"/>
+      </p:ext>
+    </p:extLst>
+  </p:cSld>
+  <p:clrMapOvr>
+    <a:masterClrMapping/>
+  </p:clrMapOvr>
+</p:sld>
+</file>
+
 <file path=ppt/theme/theme1.xml><?xml version="1.0" encoding="utf-8"?>
 <a:theme xmlns:a="http://schemas.openxmlformats.org/drawingml/2006/main" name="Office Theme">
   <a:themeElements>

</xml_diff>